<commit_message>
Ændret i diagrammerne plus lavet præsentation i PP
</commit_message>
<xml_diff>
--- a/Aflevering 3/Navy Structure Composite Pattern.pptx
+++ b/Aflevering 3/Navy Structure Composite Pattern.pptx
@@ -7,6 +7,10 @@
   <p:sldIdLst>
     <p:sldId id="256" r:id="rId2"/>
     <p:sldId id="257" r:id="rId3"/>
+    <p:sldId id="258" r:id="rId4"/>
+    <p:sldId id="259" r:id="rId5"/>
+    <p:sldId id="261" r:id="rId6"/>
+    <p:sldId id="260" r:id="rId7"/>
   </p:sldIdLst>
   <p:sldSz cx="12192000" cy="6858000"/>
   <p:notesSz cx="6858000" cy="9144000"/>
@@ -155,10 +159,9 @@
           </a:lstStyle>
           <a:p>
             <a:r>
-              <a:rPr lang="da-DK" smtClean="0"/>
+              <a:rPr lang="da-DK"/>
               <a:t>Klik for at redigere i master</a:t>
             </a:r>
-            <a:endParaRPr lang="da-DK"/>
           </a:p>
         </p:txBody>
       </p:sp>
@@ -220,10 +223,9 @@
           </a:lstStyle>
           <a:p>
             <a:r>
-              <a:rPr lang="da-DK" smtClean="0"/>
+              <a:rPr lang="da-DK"/>
               <a:t>Klik for at redigere i master</a:t>
             </a:r>
-            <a:endParaRPr lang="da-DK"/>
           </a:p>
         </p:txBody>
       </p:sp>
@@ -338,10 +340,9 @@
           <a:lstStyle/>
           <a:p>
             <a:r>
-              <a:rPr lang="da-DK" smtClean="0"/>
+              <a:rPr lang="da-DK"/>
               <a:t>Klik for at redigere i master</a:t>
             </a:r>
-            <a:endParaRPr lang="da-DK"/>
           </a:p>
         </p:txBody>
       </p:sp>
@@ -362,38 +363,37 @@
           <a:p>
             <a:pPr lvl="0"/>
             <a:r>
-              <a:rPr lang="da-DK" smtClean="0"/>
+              <a:rPr lang="da-DK"/>
               <a:t>Klik for at redigere i master</a:t>
             </a:r>
           </a:p>
           <a:p>
             <a:pPr lvl="1"/>
             <a:r>
-              <a:rPr lang="da-DK" smtClean="0"/>
+              <a:rPr lang="da-DK"/>
               <a:t>Andet niveau</a:t>
             </a:r>
           </a:p>
           <a:p>
             <a:pPr lvl="2"/>
             <a:r>
-              <a:rPr lang="da-DK" smtClean="0"/>
+              <a:rPr lang="da-DK"/>
               <a:t>Tredje niveau</a:t>
             </a:r>
           </a:p>
           <a:p>
             <a:pPr lvl="3"/>
             <a:r>
-              <a:rPr lang="da-DK" smtClean="0"/>
+              <a:rPr lang="da-DK"/>
               <a:t>Fjerde niveau</a:t>
             </a:r>
           </a:p>
           <a:p>
             <a:pPr lvl="4"/>
             <a:r>
-              <a:rPr lang="da-DK" smtClean="0"/>
+              <a:rPr lang="da-DK"/>
               <a:t>Femte niveau</a:t>
             </a:r>
-            <a:endParaRPr lang="da-DK"/>
           </a:p>
         </p:txBody>
       </p:sp>
@@ -513,10 +513,9 @@
           <a:lstStyle/>
           <a:p>
             <a:r>
-              <a:rPr lang="da-DK" smtClean="0"/>
+              <a:rPr lang="da-DK"/>
               <a:t>Klik for at redigere i master</a:t>
             </a:r>
-            <a:endParaRPr lang="da-DK"/>
           </a:p>
         </p:txBody>
       </p:sp>
@@ -542,38 +541,37 @@
           <a:p>
             <a:pPr lvl="0"/>
             <a:r>
-              <a:rPr lang="da-DK" smtClean="0"/>
+              <a:rPr lang="da-DK"/>
               <a:t>Klik for at redigere i master</a:t>
             </a:r>
           </a:p>
           <a:p>
             <a:pPr lvl="1"/>
             <a:r>
-              <a:rPr lang="da-DK" smtClean="0"/>
+              <a:rPr lang="da-DK"/>
               <a:t>Andet niveau</a:t>
             </a:r>
           </a:p>
           <a:p>
             <a:pPr lvl="2"/>
             <a:r>
-              <a:rPr lang="da-DK" smtClean="0"/>
+              <a:rPr lang="da-DK"/>
               <a:t>Tredje niveau</a:t>
             </a:r>
           </a:p>
           <a:p>
             <a:pPr lvl="3"/>
             <a:r>
-              <a:rPr lang="da-DK" smtClean="0"/>
+              <a:rPr lang="da-DK"/>
               <a:t>Fjerde niveau</a:t>
             </a:r>
           </a:p>
           <a:p>
             <a:pPr lvl="4"/>
             <a:r>
-              <a:rPr lang="da-DK" smtClean="0"/>
+              <a:rPr lang="da-DK"/>
               <a:t>Femte niveau</a:t>
             </a:r>
-            <a:endParaRPr lang="da-DK"/>
           </a:p>
         </p:txBody>
       </p:sp>
@@ -688,10 +686,9 @@
           <a:lstStyle/>
           <a:p>
             <a:r>
-              <a:rPr lang="da-DK" smtClean="0"/>
+              <a:rPr lang="da-DK"/>
               <a:t>Klik for at redigere i master</a:t>
             </a:r>
-            <a:endParaRPr lang="da-DK"/>
           </a:p>
         </p:txBody>
       </p:sp>
@@ -712,38 +709,37 @@
           <a:p>
             <a:pPr lvl="0"/>
             <a:r>
-              <a:rPr lang="da-DK" smtClean="0"/>
+              <a:rPr lang="da-DK"/>
               <a:t>Klik for at redigere i master</a:t>
             </a:r>
           </a:p>
           <a:p>
             <a:pPr lvl="1"/>
             <a:r>
-              <a:rPr lang="da-DK" smtClean="0"/>
+              <a:rPr lang="da-DK"/>
               <a:t>Andet niveau</a:t>
             </a:r>
           </a:p>
           <a:p>
             <a:pPr lvl="2"/>
             <a:r>
-              <a:rPr lang="da-DK" smtClean="0"/>
+              <a:rPr lang="da-DK"/>
               <a:t>Tredje niveau</a:t>
             </a:r>
           </a:p>
           <a:p>
             <a:pPr lvl="3"/>
             <a:r>
-              <a:rPr lang="da-DK" smtClean="0"/>
+              <a:rPr lang="da-DK"/>
               <a:t>Fjerde niveau</a:t>
             </a:r>
           </a:p>
           <a:p>
             <a:pPr lvl="4"/>
             <a:r>
-              <a:rPr lang="da-DK" smtClean="0"/>
+              <a:rPr lang="da-DK"/>
               <a:t>Femte niveau</a:t>
             </a:r>
-            <a:endParaRPr lang="da-DK"/>
           </a:p>
         </p:txBody>
       </p:sp>
@@ -867,10 +863,9 @@
           </a:lstStyle>
           <a:p>
             <a:r>
-              <a:rPr lang="da-DK" smtClean="0"/>
+              <a:rPr lang="da-DK"/>
               <a:t>Klik for at redigere i master</a:t>
             </a:r>
-            <a:endParaRPr lang="da-DK"/>
           </a:p>
         </p:txBody>
       </p:sp>
@@ -987,7 +982,7 @@
           <a:p>
             <a:pPr lvl="0"/>
             <a:r>
-              <a:rPr lang="da-DK" smtClean="0"/>
+              <a:rPr lang="da-DK"/>
               <a:t>Klik for at redigere i master</a:t>
             </a:r>
           </a:p>
@@ -1104,10 +1099,9 @@
           <a:lstStyle/>
           <a:p>
             <a:r>
-              <a:rPr lang="da-DK" smtClean="0"/>
+              <a:rPr lang="da-DK"/>
               <a:t>Klik for at redigere i master</a:t>
             </a:r>
-            <a:endParaRPr lang="da-DK"/>
           </a:p>
         </p:txBody>
       </p:sp>
@@ -1133,38 +1127,37 @@
           <a:p>
             <a:pPr lvl="0"/>
             <a:r>
-              <a:rPr lang="da-DK" smtClean="0"/>
+              <a:rPr lang="da-DK"/>
               <a:t>Klik for at redigere i master</a:t>
             </a:r>
           </a:p>
           <a:p>
             <a:pPr lvl="1"/>
             <a:r>
-              <a:rPr lang="da-DK" smtClean="0"/>
+              <a:rPr lang="da-DK"/>
               <a:t>Andet niveau</a:t>
             </a:r>
           </a:p>
           <a:p>
             <a:pPr lvl="2"/>
             <a:r>
-              <a:rPr lang="da-DK" smtClean="0"/>
+              <a:rPr lang="da-DK"/>
               <a:t>Tredje niveau</a:t>
             </a:r>
           </a:p>
           <a:p>
             <a:pPr lvl="3"/>
             <a:r>
-              <a:rPr lang="da-DK" smtClean="0"/>
+              <a:rPr lang="da-DK"/>
               <a:t>Fjerde niveau</a:t>
             </a:r>
           </a:p>
           <a:p>
             <a:pPr lvl="4"/>
             <a:r>
-              <a:rPr lang="da-DK" smtClean="0"/>
+              <a:rPr lang="da-DK"/>
               <a:t>Femte niveau</a:t>
             </a:r>
-            <a:endParaRPr lang="da-DK"/>
           </a:p>
         </p:txBody>
       </p:sp>
@@ -1190,38 +1183,37 @@
           <a:p>
             <a:pPr lvl="0"/>
             <a:r>
-              <a:rPr lang="da-DK" smtClean="0"/>
+              <a:rPr lang="da-DK"/>
               <a:t>Klik for at redigere i master</a:t>
             </a:r>
           </a:p>
           <a:p>
             <a:pPr lvl="1"/>
             <a:r>
-              <a:rPr lang="da-DK" smtClean="0"/>
+              <a:rPr lang="da-DK"/>
               <a:t>Andet niveau</a:t>
             </a:r>
           </a:p>
           <a:p>
             <a:pPr lvl="2"/>
             <a:r>
-              <a:rPr lang="da-DK" smtClean="0"/>
+              <a:rPr lang="da-DK"/>
               <a:t>Tredje niveau</a:t>
             </a:r>
           </a:p>
           <a:p>
             <a:pPr lvl="3"/>
             <a:r>
-              <a:rPr lang="da-DK" smtClean="0"/>
+              <a:rPr lang="da-DK"/>
               <a:t>Fjerde niveau</a:t>
             </a:r>
           </a:p>
           <a:p>
             <a:pPr lvl="4"/>
             <a:r>
-              <a:rPr lang="da-DK" smtClean="0"/>
+              <a:rPr lang="da-DK"/>
               <a:t>Femte niveau</a:t>
             </a:r>
-            <a:endParaRPr lang="da-DK"/>
           </a:p>
         </p:txBody>
       </p:sp>
@@ -1341,10 +1333,9 @@
           <a:lstStyle/>
           <a:p>
             <a:r>
-              <a:rPr lang="da-DK" smtClean="0"/>
+              <a:rPr lang="da-DK"/>
               <a:t>Klik for at redigere i master</a:t>
             </a:r>
-            <a:endParaRPr lang="da-DK"/>
           </a:p>
         </p:txBody>
       </p:sp>
@@ -1407,7 +1398,7 @@
           <a:p>
             <a:pPr lvl="0"/>
             <a:r>
-              <a:rPr lang="da-DK" smtClean="0"/>
+              <a:rPr lang="da-DK"/>
               <a:t>Klik for at redigere i master</a:t>
             </a:r>
           </a:p>
@@ -1435,38 +1426,37 @@
           <a:p>
             <a:pPr lvl="0"/>
             <a:r>
-              <a:rPr lang="da-DK" smtClean="0"/>
+              <a:rPr lang="da-DK"/>
               <a:t>Klik for at redigere i master</a:t>
             </a:r>
           </a:p>
           <a:p>
             <a:pPr lvl="1"/>
             <a:r>
-              <a:rPr lang="da-DK" smtClean="0"/>
+              <a:rPr lang="da-DK"/>
               <a:t>Andet niveau</a:t>
             </a:r>
           </a:p>
           <a:p>
             <a:pPr lvl="2"/>
             <a:r>
-              <a:rPr lang="da-DK" smtClean="0"/>
+              <a:rPr lang="da-DK"/>
               <a:t>Tredje niveau</a:t>
             </a:r>
           </a:p>
           <a:p>
             <a:pPr lvl="3"/>
             <a:r>
-              <a:rPr lang="da-DK" smtClean="0"/>
+              <a:rPr lang="da-DK"/>
               <a:t>Fjerde niveau</a:t>
             </a:r>
           </a:p>
           <a:p>
             <a:pPr lvl="4"/>
             <a:r>
-              <a:rPr lang="da-DK" smtClean="0"/>
+              <a:rPr lang="da-DK"/>
               <a:t>Femte niveau</a:t>
             </a:r>
-            <a:endParaRPr lang="da-DK"/>
           </a:p>
         </p:txBody>
       </p:sp>
@@ -1529,7 +1519,7 @@
           <a:p>
             <a:pPr lvl="0"/>
             <a:r>
-              <a:rPr lang="da-DK" smtClean="0"/>
+              <a:rPr lang="da-DK"/>
               <a:t>Klik for at redigere i master</a:t>
             </a:r>
           </a:p>
@@ -1557,38 +1547,37 @@
           <a:p>
             <a:pPr lvl="0"/>
             <a:r>
-              <a:rPr lang="da-DK" smtClean="0"/>
+              <a:rPr lang="da-DK"/>
               <a:t>Klik for at redigere i master</a:t>
             </a:r>
           </a:p>
           <a:p>
             <a:pPr lvl="1"/>
             <a:r>
-              <a:rPr lang="da-DK" smtClean="0"/>
+              <a:rPr lang="da-DK"/>
               <a:t>Andet niveau</a:t>
             </a:r>
           </a:p>
           <a:p>
             <a:pPr lvl="2"/>
             <a:r>
-              <a:rPr lang="da-DK" smtClean="0"/>
+              <a:rPr lang="da-DK"/>
               <a:t>Tredje niveau</a:t>
             </a:r>
           </a:p>
           <a:p>
             <a:pPr lvl="3"/>
             <a:r>
-              <a:rPr lang="da-DK" smtClean="0"/>
+              <a:rPr lang="da-DK"/>
               <a:t>Fjerde niveau</a:t>
             </a:r>
           </a:p>
           <a:p>
             <a:pPr lvl="4"/>
             <a:r>
-              <a:rPr lang="da-DK" smtClean="0"/>
+              <a:rPr lang="da-DK"/>
               <a:t>Femte niveau</a:t>
             </a:r>
-            <a:endParaRPr lang="da-DK"/>
           </a:p>
         </p:txBody>
       </p:sp>
@@ -1703,10 +1692,9 @@
           <a:lstStyle/>
           <a:p>
             <a:r>
-              <a:rPr lang="da-DK" smtClean="0"/>
+              <a:rPr lang="da-DK"/>
               <a:t>Klik for at redigere i master</a:t>
             </a:r>
-            <a:endParaRPr lang="da-DK"/>
           </a:p>
         </p:txBody>
       </p:sp>
@@ -1925,10 +1913,9 @@
           </a:lstStyle>
           <a:p>
             <a:r>
-              <a:rPr lang="da-DK" smtClean="0"/>
+              <a:rPr lang="da-DK"/>
               <a:t>Klik for at redigere i master</a:t>
             </a:r>
-            <a:endParaRPr lang="da-DK"/>
           </a:p>
         </p:txBody>
       </p:sp>
@@ -1982,38 +1969,37 @@
           <a:p>
             <a:pPr lvl="0"/>
             <a:r>
-              <a:rPr lang="da-DK" smtClean="0"/>
+              <a:rPr lang="da-DK"/>
               <a:t>Klik for at redigere i master</a:t>
             </a:r>
           </a:p>
           <a:p>
             <a:pPr lvl="1"/>
             <a:r>
-              <a:rPr lang="da-DK" smtClean="0"/>
+              <a:rPr lang="da-DK"/>
               <a:t>Andet niveau</a:t>
             </a:r>
           </a:p>
           <a:p>
             <a:pPr lvl="2"/>
             <a:r>
-              <a:rPr lang="da-DK" smtClean="0"/>
+              <a:rPr lang="da-DK"/>
               <a:t>Tredje niveau</a:t>
             </a:r>
           </a:p>
           <a:p>
             <a:pPr lvl="3"/>
             <a:r>
-              <a:rPr lang="da-DK" smtClean="0"/>
+              <a:rPr lang="da-DK"/>
               <a:t>Fjerde niveau</a:t>
             </a:r>
           </a:p>
           <a:p>
             <a:pPr lvl="4"/>
             <a:r>
-              <a:rPr lang="da-DK" smtClean="0"/>
+              <a:rPr lang="da-DK"/>
               <a:t>Femte niveau</a:t>
             </a:r>
-            <a:endParaRPr lang="da-DK"/>
           </a:p>
         </p:txBody>
       </p:sp>
@@ -2076,7 +2062,7 @@
           <a:p>
             <a:pPr lvl="0"/>
             <a:r>
-              <a:rPr lang="da-DK" smtClean="0"/>
+              <a:rPr lang="da-DK"/>
               <a:t>Klik for at redigere i master</a:t>
             </a:r>
           </a:p>
@@ -2202,10 +2188,9 @@
           </a:lstStyle>
           <a:p>
             <a:r>
-              <a:rPr lang="da-DK" smtClean="0"/>
+              <a:rPr lang="da-DK"/>
               <a:t>Klik for at redigere i master</a:t>
             </a:r>
-            <a:endParaRPr lang="da-DK"/>
           </a:p>
         </p:txBody>
       </p:sp>
@@ -2329,7 +2314,7 @@
           <a:p>
             <a:pPr lvl="0"/>
             <a:r>
-              <a:rPr lang="da-DK" smtClean="0"/>
+              <a:rPr lang="da-DK"/>
               <a:t>Klik for at redigere i master</a:t>
             </a:r>
           </a:p>
@@ -2461,10 +2446,9 @@
           <a:lstStyle/>
           <a:p>
             <a:r>
-              <a:rPr lang="da-DK" smtClean="0"/>
+              <a:rPr lang="da-DK"/>
               <a:t>Klik for at redigere i master</a:t>
             </a:r>
-            <a:endParaRPr lang="da-DK"/>
           </a:p>
         </p:txBody>
       </p:sp>
@@ -2495,38 +2479,37 @@
           <a:p>
             <a:pPr lvl="0"/>
             <a:r>
-              <a:rPr lang="da-DK" smtClean="0"/>
+              <a:rPr lang="da-DK"/>
               <a:t>Klik for at redigere i master</a:t>
             </a:r>
           </a:p>
           <a:p>
             <a:pPr lvl="1"/>
             <a:r>
-              <a:rPr lang="da-DK" smtClean="0"/>
+              <a:rPr lang="da-DK"/>
               <a:t>Andet niveau</a:t>
             </a:r>
           </a:p>
           <a:p>
             <a:pPr lvl="2"/>
             <a:r>
-              <a:rPr lang="da-DK" smtClean="0"/>
+              <a:rPr lang="da-DK"/>
               <a:t>Tredje niveau</a:t>
             </a:r>
           </a:p>
           <a:p>
             <a:pPr lvl="3"/>
             <a:r>
-              <a:rPr lang="da-DK" smtClean="0"/>
+              <a:rPr lang="da-DK"/>
               <a:t>Fjerde niveau</a:t>
             </a:r>
           </a:p>
           <a:p>
             <a:pPr lvl="4"/>
             <a:r>
-              <a:rPr lang="da-DK" smtClean="0"/>
+              <a:rPr lang="da-DK"/>
               <a:t>Femte niveau</a:t>
             </a:r>
-            <a:endParaRPr lang="da-DK"/>
           </a:p>
         </p:txBody>
       </p:sp>
@@ -2982,35 +2965,36 @@
         </p:nvSpPr>
         <p:spPr/>
         <p:txBody>
-          <a:bodyPr/>
-          <a:lstStyle/>
-          <a:p>
-            <a:r>
-              <a:rPr lang="da-DK" dirty="0" err="1" smtClean="0"/>
+          <a:bodyPr>
+            <a:normAutofit fontScale="90000"/>
+          </a:bodyPr>
+          <a:lstStyle/>
+          <a:p>
+            <a:br>
+              <a:rPr lang="da-DK" dirty="0"/>
+            </a:br>
+            <a:r>
+              <a:rPr lang="da-DK" dirty="0" err="1"/>
+              <a:t>Composite</a:t>
+            </a:r>
+            <a:r>
+              <a:rPr lang="da-DK" dirty="0"/>
+              <a:t> Pattern </a:t>
+            </a:r>
+            <a:br>
+              <a:rPr lang="da-DK" dirty="0"/>
+            </a:br>
+            <a:r>
+              <a:rPr lang="da-DK" dirty="0" err="1"/>
               <a:t>Navy</a:t>
             </a:r>
             <a:r>
-              <a:rPr lang="da-DK" dirty="0" smtClean="0"/>
+              <a:rPr lang="da-DK" dirty="0"/>
               <a:t> </a:t>
             </a:r>
             <a:r>
-              <a:rPr lang="da-DK" dirty="0" err="1" smtClean="0"/>
-              <a:t>Structure</a:t>
-            </a:r>
-            <a:r>
-              <a:rPr lang="da-DK" dirty="0" smtClean="0"/>
-              <a:t/>
-            </a:r>
-            <a:br>
-              <a:rPr lang="da-DK" dirty="0" smtClean="0"/>
-            </a:br>
-            <a:r>
-              <a:rPr lang="da-DK" dirty="0" err="1" smtClean="0"/>
-              <a:t>Composite</a:t>
-            </a:r>
-            <a:r>
-              <a:rPr lang="da-DK" dirty="0" smtClean="0"/>
-              <a:t> Pattern</a:t>
+              <a:rPr lang="da-DK" dirty="0" err="1"/>
+              <a:t>structure</a:t>
             </a:r>
             <a:endParaRPr lang="da-DK" dirty="0"/>
           </a:p>
@@ -3032,30 +3016,29 @@
           <a:lstStyle/>
           <a:p>
             <a:r>
-              <a:rPr lang="da-DK" dirty="0" smtClean="0"/>
-              <a:t>Gruppe 46</a:t>
-            </a:r>
-          </a:p>
-          <a:p>
-            <a:r>
-              <a:rPr lang="da-DK" dirty="0" smtClean="0"/>
+              <a:rPr lang="da-DK" dirty="0"/>
+              <a:t>Gruppe 4</a:t>
+            </a:r>
+          </a:p>
+          <a:p>
+            <a:r>
+              <a:rPr lang="da-DK" dirty="0"/>
               <a:t>Fatima </a:t>
             </a:r>
             <a:r>
-              <a:rPr lang="da-DK" dirty="0" err="1" smtClean="0"/>
+              <a:rPr lang="da-DK" dirty="0" err="1"/>
               <a:t>Kodro</a:t>
             </a:r>
             <a:r>
-              <a:rPr lang="da-DK" dirty="0" smtClean="0"/>
+              <a:rPr lang="da-DK" dirty="0"/>
               <a:t>, Daniel Hansen, </a:t>
             </a:r>
           </a:p>
           <a:p>
             <a:r>
-              <a:rPr lang="da-DK" dirty="0" smtClean="0"/>
+              <a:rPr lang="da-DK" dirty="0"/>
               <a:t>Søren Bech, Martin Andersen</a:t>
             </a:r>
-            <a:endParaRPr lang="da-DK" dirty="0"/>
           </a:p>
         </p:txBody>
       </p:sp>
@@ -3105,36 +3088,459 @@
           <a:lstStyle/>
           <a:p>
             <a:r>
-              <a:rPr lang="da-DK" smtClean="0"/>
-              <a:t>Børn</a:t>
-            </a:r>
-            <a:endParaRPr lang="da-DK"/>
-          </a:p>
-        </p:txBody>
-      </p:sp>
-      <p:sp>
-        <p:nvSpPr>
-          <p:cNvPr id="3" name="Pladsholder til indhold 2"/>
-          <p:cNvSpPr>
-            <a:spLocks noGrp="1"/>
-          </p:cNvSpPr>
+              <a:rPr lang="da-DK"/>
+              <a:t>Structure</a:t>
+            </a:r>
+            <a:endParaRPr lang="da-DK" dirty="0"/>
+          </a:p>
+        </p:txBody>
+      </p:sp>
+      <p:pic>
+        <p:nvPicPr>
+          <p:cNvPr id="4" name="Pladsholder til indhold 3">
+            <a:extLst>
+              <a:ext uri="{FF2B5EF4-FFF2-40B4-BE49-F238E27FC236}">
+                <a16:creationId xmlns:a16="http://schemas.microsoft.com/office/drawing/2014/main" id="{3B9C59C4-7281-44E4-A85A-4ECEA4DB96F9}"/>
+              </a:ext>
+            </a:extLst>
+          </p:cNvPr>
+          <p:cNvPicPr>
+            <a:picLocks noGrp="1" noChangeAspect="1"/>
+          </p:cNvPicPr>
           <p:nvPr>
             <p:ph idx="1"/>
           </p:nvPr>
-        </p:nvSpPr>
-        <p:spPr/>
-        <p:txBody>
-          <a:bodyPr/>
-          <a:lstStyle/>
-          <a:p>
-            <a:endParaRPr lang="da-DK"/>
-          </a:p>
-        </p:txBody>
-      </p:sp>
+        </p:nvPicPr>
+        <p:blipFill>
+          <a:blip r:embed="rId2"/>
+          <a:stretch>
+            <a:fillRect/>
+          </a:stretch>
+        </p:blipFill>
+        <p:spPr>
+          <a:xfrm>
+            <a:off x="2665535" y="2088357"/>
+            <a:ext cx="6667500" cy="3238500"/>
+          </a:xfrm>
+          <a:prstGeom prst="rect">
+            <a:avLst/>
+          </a:prstGeom>
+        </p:spPr>
+      </p:pic>
     </p:spTree>
     <p:extLst>
       <p:ext uri="{BB962C8B-B14F-4D97-AF65-F5344CB8AC3E}">
         <p14:creationId xmlns:p14="http://schemas.microsoft.com/office/powerpoint/2010/main" val="669640310"/>
+      </p:ext>
+    </p:extLst>
+  </p:cSld>
+  <p:clrMapOvr>
+    <a:masterClrMapping/>
+  </p:clrMapOvr>
+</p:sld>
+</file>
+
+<file path=ppt/slides/slide3.xml><?xml version="1.0" encoding="utf-8"?>
+<p:sld xmlns:a="http://schemas.openxmlformats.org/drawingml/2006/main" xmlns:r="http://schemas.openxmlformats.org/officeDocument/2006/relationships" xmlns:p="http://schemas.openxmlformats.org/presentationml/2006/main">
+  <p:cSld>
+    <p:spTree>
+      <p:nvGrpSpPr>
+        <p:cNvPr id="1" name=""/>
+        <p:cNvGrpSpPr/>
+        <p:nvPr/>
+      </p:nvGrpSpPr>
+      <p:grpSpPr>
+        <a:xfrm>
+          <a:off x="0" y="0"/>
+          <a:ext cx="0" cy="0"/>
+          <a:chOff x="0" y="0"/>
+          <a:chExt cx="0" cy="0"/>
+        </a:xfrm>
+      </p:grpSpPr>
+      <p:sp>
+        <p:nvSpPr>
+          <p:cNvPr id="2" name="Titel 1">
+            <a:extLst>
+              <a:ext uri="{FF2B5EF4-FFF2-40B4-BE49-F238E27FC236}">
+                <a16:creationId xmlns:a16="http://schemas.microsoft.com/office/drawing/2014/main" id="{DCD50568-8FA1-4BB9-8B3A-F3D3B6EEFBA2}"/>
+              </a:ext>
+            </a:extLst>
+          </p:cNvPr>
+          <p:cNvSpPr>
+            <a:spLocks noGrp="1"/>
+          </p:cNvSpPr>
+          <p:nvPr>
+            <p:ph type="title"/>
+          </p:nvPr>
+        </p:nvSpPr>
+        <p:spPr/>
+        <p:txBody>
+          <a:bodyPr/>
+          <a:lstStyle/>
+          <a:p>
+            <a:r>
+              <a:rPr lang="da-DK" dirty="0" err="1"/>
+              <a:t>Example</a:t>
+            </a:r>
+            <a:endParaRPr lang="da-DK" dirty="0"/>
+          </a:p>
+        </p:txBody>
+      </p:sp>
+      <p:pic>
+        <p:nvPicPr>
+          <p:cNvPr id="4" name="Pladsholder til indhold 3">
+            <a:extLst>
+              <a:ext uri="{FF2B5EF4-FFF2-40B4-BE49-F238E27FC236}">
+                <a16:creationId xmlns:a16="http://schemas.microsoft.com/office/drawing/2014/main" id="{B039083F-D61E-441E-8A93-F29EC5D31AF5}"/>
+              </a:ext>
+            </a:extLst>
+          </p:cNvPr>
+          <p:cNvPicPr>
+            <a:picLocks noGrp="1" noChangeAspect="1"/>
+          </p:cNvPicPr>
+          <p:nvPr>
+            <p:ph idx="1"/>
+          </p:nvPr>
+        </p:nvPicPr>
+        <p:blipFill>
+          <a:blip r:embed="rId2"/>
+          <a:stretch>
+            <a:fillRect/>
+          </a:stretch>
+        </p:blipFill>
+        <p:spPr>
+          <a:xfrm>
+            <a:off x="3479154" y="1825625"/>
+            <a:ext cx="5233692" cy="4351338"/>
+          </a:xfrm>
+          <a:prstGeom prst="rect">
+            <a:avLst/>
+          </a:prstGeom>
+        </p:spPr>
+      </p:pic>
+    </p:spTree>
+    <p:extLst>
+      <p:ext uri="{BB962C8B-B14F-4D97-AF65-F5344CB8AC3E}">
+        <p14:creationId xmlns:p14="http://schemas.microsoft.com/office/powerpoint/2010/main" val="3089667093"/>
+      </p:ext>
+    </p:extLst>
+  </p:cSld>
+  <p:clrMapOvr>
+    <a:masterClrMapping/>
+  </p:clrMapOvr>
+</p:sld>
+</file>
+
+<file path=ppt/slides/slide4.xml><?xml version="1.0" encoding="utf-8"?>
+<p:sld xmlns:a="http://schemas.openxmlformats.org/drawingml/2006/main" xmlns:r="http://schemas.openxmlformats.org/officeDocument/2006/relationships" xmlns:p="http://schemas.openxmlformats.org/presentationml/2006/main">
+  <p:cSld>
+    <p:spTree>
+      <p:nvGrpSpPr>
+        <p:cNvPr id="1" name=""/>
+        <p:cNvGrpSpPr/>
+        <p:nvPr/>
+      </p:nvGrpSpPr>
+      <p:grpSpPr>
+        <a:xfrm>
+          <a:off x="0" y="0"/>
+          <a:ext cx="0" cy="0"/>
+          <a:chOff x="0" y="0"/>
+          <a:chExt cx="0" cy="0"/>
+        </a:xfrm>
+      </p:grpSpPr>
+      <p:sp>
+        <p:nvSpPr>
+          <p:cNvPr id="2" name="Titel 1">
+            <a:extLst>
+              <a:ext uri="{FF2B5EF4-FFF2-40B4-BE49-F238E27FC236}">
+                <a16:creationId xmlns:a16="http://schemas.microsoft.com/office/drawing/2014/main" id="{8AFA5085-7572-4CF2-A06B-7BE2E4F4FA13}"/>
+              </a:ext>
+            </a:extLst>
+          </p:cNvPr>
+          <p:cNvSpPr>
+            <a:spLocks noGrp="1"/>
+          </p:cNvSpPr>
+          <p:nvPr>
+            <p:ph type="title"/>
+          </p:nvPr>
+        </p:nvSpPr>
+        <p:spPr/>
+        <p:txBody>
+          <a:bodyPr/>
+          <a:lstStyle/>
+          <a:p>
+            <a:r>
+              <a:rPr lang="da-DK" dirty="0" err="1"/>
+              <a:t>Sequence</a:t>
+            </a:r>
+            <a:r>
+              <a:rPr lang="da-DK" dirty="0"/>
+              <a:t> diagram</a:t>
+            </a:r>
+          </a:p>
+        </p:txBody>
+      </p:sp>
+      <p:pic>
+        <p:nvPicPr>
+          <p:cNvPr id="4" name="Pladsholder til indhold 3">
+            <a:extLst>
+              <a:ext uri="{FF2B5EF4-FFF2-40B4-BE49-F238E27FC236}">
+                <a16:creationId xmlns:a16="http://schemas.microsoft.com/office/drawing/2014/main" id="{5C11F194-7370-4F87-9FA5-E3D871D39865}"/>
+              </a:ext>
+            </a:extLst>
+          </p:cNvPr>
+          <p:cNvPicPr>
+            <a:picLocks noGrp="1" noChangeAspect="1"/>
+          </p:cNvPicPr>
+          <p:nvPr>
+            <p:ph idx="1"/>
+          </p:nvPr>
+        </p:nvPicPr>
+        <p:blipFill>
+          <a:blip r:embed="rId2"/>
+          <a:stretch>
+            <a:fillRect/>
+          </a:stretch>
+        </p:blipFill>
+        <p:spPr>
+          <a:xfrm>
+            <a:off x="2872445" y="1825625"/>
+            <a:ext cx="6447109" cy="4351338"/>
+          </a:xfrm>
+          <a:prstGeom prst="rect">
+            <a:avLst/>
+          </a:prstGeom>
+        </p:spPr>
+      </p:pic>
+    </p:spTree>
+    <p:extLst>
+      <p:ext uri="{BB962C8B-B14F-4D97-AF65-F5344CB8AC3E}">
+        <p14:creationId xmlns:p14="http://schemas.microsoft.com/office/powerpoint/2010/main" val="1546812545"/>
+      </p:ext>
+    </p:extLst>
+  </p:cSld>
+  <p:clrMapOvr>
+    <a:masterClrMapping/>
+  </p:clrMapOvr>
+</p:sld>
+</file>
+
+<file path=ppt/slides/slide5.xml><?xml version="1.0" encoding="utf-8"?>
+<p:sld xmlns:a="http://schemas.openxmlformats.org/drawingml/2006/main" xmlns:r="http://schemas.openxmlformats.org/officeDocument/2006/relationships" xmlns:p="http://schemas.openxmlformats.org/presentationml/2006/main">
+  <p:cSld>
+    <p:spTree>
+      <p:nvGrpSpPr>
+        <p:cNvPr id="1" name=""/>
+        <p:cNvGrpSpPr/>
+        <p:nvPr/>
+      </p:nvGrpSpPr>
+      <p:grpSpPr>
+        <a:xfrm>
+          <a:off x="0" y="0"/>
+          <a:ext cx="0" cy="0"/>
+          <a:chOff x="0" y="0"/>
+          <a:chExt cx="0" cy="0"/>
+        </a:xfrm>
+      </p:grpSpPr>
+      <p:sp>
+        <p:nvSpPr>
+          <p:cNvPr id="2" name="Titel 1">
+            <a:extLst>
+              <a:ext uri="{FF2B5EF4-FFF2-40B4-BE49-F238E27FC236}">
+                <a16:creationId xmlns:a16="http://schemas.microsoft.com/office/drawing/2014/main" id="{5E84420B-90F7-4D99-829E-FF1BF7DB1721}"/>
+              </a:ext>
+            </a:extLst>
+          </p:cNvPr>
+          <p:cNvSpPr>
+            <a:spLocks noGrp="1"/>
+          </p:cNvSpPr>
+          <p:nvPr>
+            <p:ph type="title"/>
+          </p:nvPr>
+        </p:nvSpPr>
+        <p:spPr/>
+        <p:txBody>
+          <a:bodyPr/>
+          <a:lstStyle/>
+          <a:p>
+            <a:r>
+              <a:rPr lang="da-DK" dirty="0"/>
+              <a:t>Tree </a:t>
+            </a:r>
+            <a:r>
+              <a:rPr lang="da-DK" dirty="0" err="1"/>
+              <a:t>structure</a:t>
+            </a:r>
+            <a:endParaRPr lang="da-DK" dirty="0"/>
+          </a:p>
+        </p:txBody>
+      </p:sp>
+      <p:pic>
+        <p:nvPicPr>
+          <p:cNvPr id="4" name="Pladsholder til indhold 3">
+            <a:extLst>
+              <a:ext uri="{FF2B5EF4-FFF2-40B4-BE49-F238E27FC236}">
+                <a16:creationId xmlns:a16="http://schemas.microsoft.com/office/drawing/2014/main" id="{453886DE-2DDA-4BEF-AAC6-629388CADDC9}"/>
+              </a:ext>
+            </a:extLst>
+          </p:cNvPr>
+          <p:cNvPicPr>
+            <a:picLocks noGrp="1" noChangeAspect="1"/>
+          </p:cNvPicPr>
+          <p:nvPr>
+            <p:ph idx="1"/>
+          </p:nvPr>
+        </p:nvPicPr>
+        <p:blipFill>
+          <a:blip r:embed="rId2"/>
+          <a:stretch>
+            <a:fillRect/>
+          </a:stretch>
+        </p:blipFill>
+        <p:spPr>
+          <a:xfrm>
+            <a:off x="1795462" y="2910681"/>
+            <a:ext cx="8601075" cy="2181225"/>
+          </a:xfrm>
+          <a:prstGeom prst="rect">
+            <a:avLst/>
+          </a:prstGeom>
+        </p:spPr>
+      </p:pic>
+    </p:spTree>
+    <p:extLst>
+      <p:ext uri="{BB962C8B-B14F-4D97-AF65-F5344CB8AC3E}">
+        <p14:creationId xmlns:p14="http://schemas.microsoft.com/office/powerpoint/2010/main" val="1251676457"/>
+      </p:ext>
+    </p:extLst>
+  </p:cSld>
+  <p:clrMapOvr>
+    <a:masterClrMapping/>
+  </p:clrMapOvr>
+</p:sld>
+</file>
+
+<file path=ppt/slides/slide6.xml><?xml version="1.0" encoding="utf-8"?>
+<p:sld xmlns:a="http://schemas.openxmlformats.org/drawingml/2006/main" xmlns:r="http://schemas.openxmlformats.org/officeDocument/2006/relationships" xmlns:p="http://schemas.openxmlformats.org/presentationml/2006/main">
+  <p:cSld>
+    <p:spTree>
+      <p:nvGrpSpPr>
+        <p:cNvPr id="1" name=""/>
+        <p:cNvGrpSpPr/>
+        <p:nvPr/>
+      </p:nvGrpSpPr>
+      <p:grpSpPr>
+        <a:xfrm>
+          <a:off x="0" y="0"/>
+          <a:ext cx="0" cy="0"/>
+          <a:chOff x="0" y="0"/>
+          <a:chExt cx="0" cy="0"/>
+        </a:xfrm>
+      </p:grpSpPr>
+      <p:sp>
+        <p:nvSpPr>
+          <p:cNvPr id="2" name="Titel 1">
+            <a:extLst>
+              <a:ext uri="{FF2B5EF4-FFF2-40B4-BE49-F238E27FC236}">
+                <a16:creationId xmlns:a16="http://schemas.microsoft.com/office/drawing/2014/main" id="{4AC9FC2A-FBFF-4C1C-9CE6-080EFA1DA6B9}"/>
+              </a:ext>
+            </a:extLst>
+          </p:cNvPr>
+          <p:cNvSpPr>
+            <a:spLocks noGrp="1"/>
+          </p:cNvSpPr>
+          <p:nvPr>
+            <p:ph type="title"/>
+          </p:nvPr>
+        </p:nvSpPr>
+        <p:spPr/>
+        <p:txBody>
+          <a:bodyPr/>
+          <a:lstStyle/>
+          <a:p>
+            <a:r>
+              <a:rPr lang="da-DK" dirty="0" err="1"/>
+              <a:t>Conclusion</a:t>
+            </a:r>
+            <a:endParaRPr lang="da-DK" dirty="0"/>
+          </a:p>
+        </p:txBody>
+      </p:sp>
+      <p:sp>
+        <p:nvSpPr>
+          <p:cNvPr id="3" name="Pladsholder til indhold 2">
+            <a:extLst>
+              <a:ext uri="{FF2B5EF4-FFF2-40B4-BE49-F238E27FC236}">
+                <a16:creationId xmlns:a16="http://schemas.microsoft.com/office/drawing/2014/main" id="{A595FA15-363D-42DB-A330-FEB682E2B11B}"/>
+              </a:ext>
+            </a:extLst>
+          </p:cNvPr>
+          <p:cNvSpPr>
+            <a:spLocks noGrp="1"/>
+          </p:cNvSpPr>
+          <p:nvPr>
+            <p:ph idx="1"/>
+          </p:nvPr>
+        </p:nvSpPr>
+        <p:spPr/>
+        <p:txBody>
+          <a:bodyPr/>
+          <a:lstStyle/>
+          <a:p>
+            <a:r>
+              <a:rPr lang="da-DK" dirty="0" err="1"/>
+              <a:t>Generic</a:t>
+            </a:r>
+            <a:r>
+              <a:rPr lang="da-DK" dirty="0"/>
+              <a:t>: Good for </a:t>
+            </a:r>
+            <a:r>
+              <a:rPr lang="da-DK" dirty="0" err="1"/>
+              <a:t>tree</a:t>
+            </a:r>
+            <a:r>
+              <a:rPr lang="da-DK" dirty="0"/>
+              <a:t> </a:t>
+            </a:r>
+            <a:r>
+              <a:rPr lang="da-DK" dirty="0" err="1"/>
+              <a:t>structures</a:t>
+            </a:r>
+            <a:r>
+              <a:rPr lang="da-DK" dirty="0"/>
+              <a:t> with the same overall type</a:t>
+            </a:r>
+          </a:p>
+          <a:p>
+            <a:r>
+              <a:rPr lang="da-DK" dirty="0" err="1"/>
+              <a:t>Some</a:t>
+            </a:r>
+            <a:r>
+              <a:rPr lang="da-DK" dirty="0"/>
+              <a:t> </a:t>
+            </a:r>
+            <a:r>
+              <a:rPr lang="da-DK" dirty="0" err="1"/>
+              <a:t>draw</a:t>
+            </a:r>
+            <a:r>
+              <a:rPr lang="da-DK" dirty="0"/>
+              <a:t> backs: Bad if wanting to </a:t>
+            </a:r>
+            <a:r>
+              <a:rPr lang="da-DK" dirty="0" err="1"/>
+              <a:t>extend</a:t>
+            </a:r>
+            <a:endParaRPr lang="da-DK" dirty="0"/>
+          </a:p>
+        </p:txBody>
+      </p:sp>
+    </p:spTree>
+    <p:extLst>
+      <p:ext uri="{BB962C8B-B14F-4D97-AF65-F5344CB8AC3E}">
+        <p14:creationId xmlns:p14="http://schemas.microsoft.com/office/powerpoint/2010/main" val="865207951"/>
       </p:ext>
     </p:extLst>
   </p:cSld>

</xml_diff>

<commit_message>
Opdateret billede i ppt
</commit_message>
<xml_diff>
--- a/Aflevering 3/Navy Structure Composite Pattern.pptx
+++ b/Aflevering 3/Navy Structure Composite Pattern.pptx
@@ -2970,6 +2970,10 @@
           </a:bodyPr>
           <a:lstStyle/>
           <a:p>
+            <a:r>
+              <a:rPr lang="da-DK" dirty="0"/>
+              <a:t/>
+            </a:r>
             <a:br>
               <a:rPr lang="da-DK" dirty="0"/>
             </a:br>
@@ -3052,6 +3056,13 @@
   <p:clrMapOvr>
     <a:masterClrMapping/>
   </p:clrMapOvr>
+  <p:timing>
+    <p:tnLst>
+      <p:par>
+        <p:cTn id="1" dur="indefinite" restart="never" nodeType="tmRoot"/>
+      </p:par>
+    </p:tnLst>
+  </p:timing>
 </p:sld>
 </file>
 
@@ -3100,7 +3111,7 @@
           <p:cNvPr id="4" name="Pladsholder til indhold 3">
             <a:extLst>
               <a:ext uri="{FF2B5EF4-FFF2-40B4-BE49-F238E27FC236}">
-                <a16:creationId xmlns:a16="http://schemas.microsoft.com/office/drawing/2014/main" id="{3B9C59C4-7281-44E4-A85A-4ECEA4DB96F9}"/>
+                <a16:creationId xmlns:a16="http://schemas.microsoft.com/office/drawing/2014/main" xmlns="" id="{3B9C59C4-7281-44E4-A85A-4ECEA4DB96F9}"/>
               </a:ext>
             </a:extLst>
           </p:cNvPr>
@@ -3137,6 +3148,13 @@
   <p:clrMapOvr>
     <a:masterClrMapping/>
   </p:clrMapOvr>
+  <p:timing>
+    <p:tnLst>
+      <p:par>
+        <p:cTn id="1" dur="indefinite" restart="never" nodeType="tmRoot"/>
+      </p:par>
+    </p:tnLst>
+  </p:timing>
 </p:sld>
 </file>
 
@@ -3162,7 +3180,7 @@
           <p:cNvPr id="2" name="Titel 1">
             <a:extLst>
               <a:ext uri="{FF2B5EF4-FFF2-40B4-BE49-F238E27FC236}">
-                <a16:creationId xmlns:a16="http://schemas.microsoft.com/office/drawing/2014/main" id="{DCD50568-8FA1-4BB9-8B3A-F3D3B6EEFBA2}"/>
+                <a16:creationId xmlns:a16="http://schemas.microsoft.com/office/drawing/2014/main" xmlns="" id="{DCD50568-8FA1-4BB9-8B3A-F3D3B6EEFBA2}"/>
               </a:ext>
             </a:extLst>
           </p:cNvPr>
@@ -3191,7 +3209,7 @@
           <p:cNvPr id="4" name="Pladsholder til indhold 3">
             <a:extLst>
               <a:ext uri="{FF2B5EF4-FFF2-40B4-BE49-F238E27FC236}">
-                <a16:creationId xmlns:a16="http://schemas.microsoft.com/office/drawing/2014/main" id="{B039083F-D61E-441E-8A93-F29EC5D31AF5}"/>
+                <a16:creationId xmlns:a16="http://schemas.microsoft.com/office/drawing/2014/main" xmlns="" id="{B039083F-D61E-441E-8A93-F29EC5D31AF5}"/>
               </a:ext>
             </a:extLst>
           </p:cNvPr>
@@ -3228,6 +3246,13 @@
   <p:clrMapOvr>
     <a:masterClrMapping/>
   </p:clrMapOvr>
+  <p:timing>
+    <p:tnLst>
+      <p:par>
+        <p:cTn id="1" dur="indefinite" restart="never" nodeType="tmRoot"/>
+      </p:par>
+    </p:tnLst>
+  </p:timing>
 </p:sld>
 </file>
 
@@ -3253,7 +3278,7 @@
           <p:cNvPr id="2" name="Titel 1">
             <a:extLst>
               <a:ext uri="{FF2B5EF4-FFF2-40B4-BE49-F238E27FC236}">
-                <a16:creationId xmlns:a16="http://schemas.microsoft.com/office/drawing/2014/main" id="{8AFA5085-7572-4CF2-A06B-7BE2E4F4FA13}"/>
+                <a16:creationId xmlns:a16="http://schemas.microsoft.com/office/drawing/2014/main" xmlns="" id="{8AFA5085-7572-4CF2-A06B-7BE2E4F4FA13}"/>
               </a:ext>
             </a:extLst>
           </p:cNvPr>
@@ -3285,7 +3310,7 @@
           <p:cNvPr id="4" name="Pladsholder til indhold 3">
             <a:extLst>
               <a:ext uri="{FF2B5EF4-FFF2-40B4-BE49-F238E27FC236}">
-                <a16:creationId xmlns:a16="http://schemas.microsoft.com/office/drawing/2014/main" id="{5C11F194-7370-4F87-9FA5-E3D871D39865}"/>
+                <a16:creationId xmlns:a16="http://schemas.microsoft.com/office/drawing/2014/main" xmlns="" id="{5C11F194-7370-4F87-9FA5-E3D871D39865}"/>
               </a:ext>
             </a:extLst>
           </p:cNvPr>
@@ -3322,6 +3347,13 @@
   <p:clrMapOvr>
     <a:masterClrMapping/>
   </p:clrMapOvr>
+  <p:timing>
+    <p:tnLst>
+      <p:par>
+        <p:cTn id="1" dur="indefinite" restart="never" nodeType="tmRoot"/>
+      </p:par>
+    </p:tnLst>
+  </p:timing>
 </p:sld>
 </file>
 
@@ -3347,7 +3379,7 @@
           <p:cNvPr id="2" name="Titel 1">
             <a:extLst>
               <a:ext uri="{FF2B5EF4-FFF2-40B4-BE49-F238E27FC236}">
-                <a16:creationId xmlns:a16="http://schemas.microsoft.com/office/drawing/2014/main" id="{5E84420B-90F7-4D99-829E-FF1BF7DB1721}"/>
+                <a16:creationId xmlns:a16="http://schemas.microsoft.com/office/drawing/2014/main" xmlns="" id="{5E84420B-90F7-4D99-829E-FF1BF7DB1721}"/>
               </a:ext>
             </a:extLst>
           </p:cNvPr>
@@ -3377,19 +3409,11 @@
       </p:sp>
       <p:pic>
         <p:nvPicPr>
-          <p:cNvPr id="4" name="Pladsholder til indhold 3">
-            <a:extLst>
-              <a:ext uri="{FF2B5EF4-FFF2-40B4-BE49-F238E27FC236}">
-                <a16:creationId xmlns:a16="http://schemas.microsoft.com/office/drawing/2014/main" id="{453886DE-2DDA-4BEF-AAC6-629388CADDC9}"/>
-              </a:ext>
-            </a:extLst>
-          </p:cNvPr>
+          <p:cNvPr id="3" name="Billede 2"/>
           <p:cNvPicPr>
-            <a:picLocks noGrp="1" noChangeAspect="1"/>
+            <a:picLocks noChangeAspect="1"/>
           </p:cNvPicPr>
-          <p:nvPr>
-            <p:ph idx="1"/>
-          </p:nvPr>
+          <p:nvPr/>
         </p:nvPicPr>
         <p:blipFill>
           <a:blip r:embed="rId2"/>
@@ -3399,14 +3423,33 @@
         </p:blipFill>
         <p:spPr>
           <a:xfrm>
-            <a:off x="1795462" y="2910681"/>
-            <a:ext cx="8601075" cy="2181225"/>
+            <a:off x="261937" y="2206970"/>
+            <a:ext cx="11668125" cy="2552700"/>
           </a:xfrm>
           <a:prstGeom prst="rect">
             <a:avLst/>
           </a:prstGeom>
         </p:spPr>
       </p:pic>
+      <p:sp>
+        <p:nvSpPr>
+          <p:cNvPr id="5" name="Pladsholder til indhold 4"/>
+          <p:cNvSpPr>
+            <a:spLocks noGrp="1"/>
+          </p:cNvSpPr>
+          <p:nvPr>
+            <p:ph idx="1"/>
+          </p:nvPr>
+        </p:nvSpPr>
+        <p:spPr/>
+        <p:txBody>
+          <a:bodyPr/>
+          <a:lstStyle/>
+          <a:p>
+            <a:endParaRPr lang="da-DK" dirty="0"/>
+          </a:p>
+        </p:txBody>
+      </p:sp>
     </p:spTree>
     <p:extLst>
       <p:ext uri="{BB962C8B-B14F-4D97-AF65-F5344CB8AC3E}">
@@ -3417,6 +3460,13 @@
   <p:clrMapOvr>
     <a:masterClrMapping/>
   </p:clrMapOvr>
+  <p:timing>
+    <p:tnLst>
+      <p:par>
+        <p:cTn id="1" dur="indefinite" restart="never" nodeType="tmRoot"/>
+      </p:par>
+    </p:tnLst>
+  </p:timing>
 </p:sld>
 </file>
 
@@ -3442,7 +3492,7 @@
           <p:cNvPr id="2" name="Titel 1">
             <a:extLst>
               <a:ext uri="{FF2B5EF4-FFF2-40B4-BE49-F238E27FC236}">
-                <a16:creationId xmlns:a16="http://schemas.microsoft.com/office/drawing/2014/main" id="{4AC9FC2A-FBFF-4C1C-9CE6-080EFA1DA6B9}"/>
+                <a16:creationId xmlns:a16="http://schemas.microsoft.com/office/drawing/2014/main" xmlns="" id="{4AC9FC2A-FBFF-4C1C-9CE6-080EFA1DA6B9}"/>
               </a:ext>
             </a:extLst>
           </p:cNvPr>
@@ -3471,7 +3521,7 @@
           <p:cNvPr id="3" name="Pladsholder til indhold 2">
             <a:extLst>
               <a:ext uri="{FF2B5EF4-FFF2-40B4-BE49-F238E27FC236}">
-                <a16:creationId xmlns:a16="http://schemas.microsoft.com/office/drawing/2014/main" id="{A595FA15-363D-42DB-A330-FEB682E2B11B}"/>
+                <a16:creationId xmlns:a16="http://schemas.microsoft.com/office/drawing/2014/main" xmlns="" id="{A595FA15-363D-42DB-A330-FEB682E2B11B}"/>
               </a:ext>
             </a:extLst>
           </p:cNvPr>
@@ -3547,6 +3597,13 @@
   <p:clrMapOvr>
     <a:masterClrMapping/>
   </p:clrMapOvr>
+  <p:timing>
+    <p:tnLst>
+      <p:par>
+        <p:cTn id="1" dur="indefinite" restart="never" nodeType="tmRoot"/>
+      </p:par>
+    </p:tnLst>
+  </p:timing>
 </p:sld>
 </file>
 

</xml_diff>

<commit_message>
Ændret ppt og solution (bedre print)
</commit_message>
<xml_diff>
--- a/Aflevering 3/Navy Structure Composite Pattern.pptx
+++ b/Aflevering 3/Navy Structure Composite Pattern.pptx
@@ -4,11 +4,14 @@
   <p:sldMasterIdLst>
     <p:sldMasterId id="2147483648" r:id="rId1"/>
   </p:sldMasterIdLst>
+  <p:notesMasterIdLst>
+    <p:notesMasterId r:id="rId8"/>
+  </p:notesMasterIdLst>
   <p:sldIdLst>
     <p:sldId id="256" r:id="rId2"/>
     <p:sldId id="257" r:id="rId3"/>
     <p:sldId id="258" r:id="rId4"/>
-    <p:sldId id="259" r:id="rId5"/>
+    <p:sldId id="262" r:id="rId5"/>
     <p:sldId id="261" r:id="rId6"/>
     <p:sldId id="260" r:id="rId7"/>
   </p:sldIdLst>
@@ -115,6 +118,496 @@
     </p:ext>
   </p:extLst>
 </p:presentation>
+</file>
+
+<file path=ppt/notesMasters/notesMaster1.xml><?xml version="1.0" encoding="utf-8"?>
+<p:notesMaster xmlns:a="http://schemas.openxmlformats.org/drawingml/2006/main" xmlns:r="http://schemas.openxmlformats.org/officeDocument/2006/relationships" xmlns:p="http://schemas.openxmlformats.org/presentationml/2006/main">
+  <p:cSld>
+    <p:bg>
+      <p:bgRef idx="1001">
+        <a:schemeClr val="bg1"/>
+      </p:bgRef>
+    </p:bg>
+    <p:spTree>
+      <p:nvGrpSpPr>
+        <p:cNvPr id="1" name=""/>
+        <p:cNvGrpSpPr/>
+        <p:nvPr/>
+      </p:nvGrpSpPr>
+      <p:grpSpPr>
+        <a:xfrm>
+          <a:off x="0" y="0"/>
+          <a:ext cx="0" cy="0"/>
+          <a:chOff x="0" y="0"/>
+          <a:chExt cx="0" cy="0"/>
+        </a:xfrm>
+      </p:grpSpPr>
+      <p:sp>
+        <p:nvSpPr>
+          <p:cNvPr id="2" name="Pladsholder til sidehoved 1"/>
+          <p:cNvSpPr>
+            <a:spLocks noGrp="1"/>
+          </p:cNvSpPr>
+          <p:nvPr>
+            <p:ph type="hdr" sz="quarter"/>
+          </p:nvPr>
+        </p:nvSpPr>
+        <p:spPr>
+          <a:xfrm>
+            <a:off x="0" y="0"/>
+            <a:ext cx="2971800" cy="458788"/>
+          </a:xfrm>
+          <a:prstGeom prst="rect">
+            <a:avLst/>
+          </a:prstGeom>
+        </p:spPr>
+        <p:txBody>
+          <a:bodyPr vert="horz" lIns="91440" tIns="45720" rIns="91440" bIns="45720" rtlCol="0"/>
+          <a:lstStyle>
+            <a:lvl1pPr algn="l">
+              <a:defRPr sz="1200"/>
+            </a:lvl1pPr>
+          </a:lstStyle>
+          <a:p>
+            <a:endParaRPr lang="da-DK"/>
+          </a:p>
+        </p:txBody>
+      </p:sp>
+      <p:sp>
+        <p:nvSpPr>
+          <p:cNvPr id="3" name="Pladsholder til dato 2"/>
+          <p:cNvSpPr>
+            <a:spLocks noGrp="1"/>
+          </p:cNvSpPr>
+          <p:nvPr>
+            <p:ph type="dt" idx="1"/>
+          </p:nvPr>
+        </p:nvSpPr>
+        <p:spPr>
+          <a:xfrm>
+            <a:off x="3884613" y="0"/>
+            <a:ext cx="2971800" cy="458788"/>
+          </a:xfrm>
+          <a:prstGeom prst="rect">
+            <a:avLst/>
+          </a:prstGeom>
+        </p:spPr>
+        <p:txBody>
+          <a:bodyPr vert="horz" lIns="91440" tIns="45720" rIns="91440" bIns="45720" rtlCol="0"/>
+          <a:lstStyle>
+            <a:lvl1pPr algn="r">
+              <a:defRPr sz="1200"/>
+            </a:lvl1pPr>
+          </a:lstStyle>
+          <a:p>
+            <a:fld id="{026C999E-74FC-4E51-88FB-E37BCA41C109}" type="datetimeFigureOut">
+              <a:rPr lang="da-DK" smtClean="0"/>
+              <a:t>13-04-2018</a:t>
+            </a:fld>
+            <a:endParaRPr lang="da-DK"/>
+          </a:p>
+        </p:txBody>
+      </p:sp>
+      <p:sp>
+        <p:nvSpPr>
+          <p:cNvPr id="4" name="Pladsholder til slidebillede 3"/>
+          <p:cNvSpPr>
+            <a:spLocks noGrp="1" noRot="1" noChangeAspect="1"/>
+          </p:cNvSpPr>
+          <p:nvPr>
+            <p:ph type="sldImg" idx="2"/>
+          </p:nvPr>
+        </p:nvSpPr>
+        <p:spPr>
+          <a:xfrm>
+            <a:off x="685800" y="1143000"/>
+            <a:ext cx="5486400" cy="3086100"/>
+          </a:xfrm>
+          <a:prstGeom prst="rect">
+            <a:avLst/>
+          </a:prstGeom>
+          <a:noFill/>
+          <a:ln w="12700">
+            <a:solidFill>
+              <a:prstClr val="black"/>
+            </a:solidFill>
+          </a:ln>
+        </p:spPr>
+        <p:txBody>
+          <a:bodyPr vert="horz" lIns="91440" tIns="45720" rIns="91440" bIns="45720" rtlCol="0" anchor="ctr"/>
+          <a:lstStyle/>
+          <a:p>
+            <a:endParaRPr lang="da-DK"/>
+          </a:p>
+        </p:txBody>
+      </p:sp>
+      <p:sp>
+        <p:nvSpPr>
+          <p:cNvPr id="5" name="Pladsholder til noter 4"/>
+          <p:cNvSpPr>
+            <a:spLocks noGrp="1"/>
+          </p:cNvSpPr>
+          <p:nvPr>
+            <p:ph type="body" sz="quarter" idx="3"/>
+          </p:nvPr>
+        </p:nvSpPr>
+        <p:spPr>
+          <a:xfrm>
+            <a:off x="685800" y="4400550"/>
+            <a:ext cx="5486400" cy="3600450"/>
+          </a:xfrm>
+          <a:prstGeom prst="rect">
+            <a:avLst/>
+          </a:prstGeom>
+        </p:spPr>
+        <p:txBody>
+          <a:bodyPr vert="horz" lIns="91440" tIns="45720" rIns="91440" bIns="45720" rtlCol="0"/>
+          <a:lstStyle/>
+          <a:p>
+            <a:pPr lvl="0"/>
+            <a:r>
+              <a:rPr lang="da-DK" smtClean="0"/>
+              <a:t>Klik for at redigere i master</a:t>
+            </a:r>
+          </a:p>
+          <a:p>
+            <a:pPr lvl="1"/>
+            <a:r>
+              <a:rPr lang="da-DK" smtClean="0"/>
+              <a:t>Andet niveau</a:t>
+            </a:r>
+          </a:p>
+          <a:p>
+            <a:pPr lvl="2"/>
+            <a:r>
+              <a:rPr lang="da-DK" smtClean="0"/>
+              <a:t>Tredje niveau</a:t>
+            </a:r>
+          </a:p>
+          <a:p>
+            <a:pPr lvl="3"/>
+            <a:r>
+              <a:rPr lang="da-DK" smtClean="0"/>
+              <a:t>Fjerde niveau</a:t>
+            </a:r>
+          </a:p>
+          <a:p>
+            <a:pPr lvl="4"/>
+            <a:r>
+              <a:rPr lang="da-DK" smtClean="0"/>
+              <a:t>Femte niveau</a:t>
+            </a:r>
+            <a:endParaRPr lang="da-DK"/>
+          </a:p>
+        </p:txBody>
+      </p:sp>
+      <p:sp>
+        <p:nvSpPr>
+          <p:cNvPr id="6" name="Pladsholder til sidefod 5"/>
+          <p:cNvSpPr>
+            <a:spLocks noGrp="1"/>
+          </p:cNvSpPr>
+          <p:nvPr>
+            <p:ph type="ftr" sz="quarter" idx="4"/>
+          </p:nvPr>
+        </p:nvSpPr>
+        <p:spPr>
+          <a:xfrm>
+            <a:off x="0" y="8685213"/>
+            <a:ext cx="2971800" cy="458787"/>
+          </a:xfrm>
+          <a:prstGeom prst="rect">
+            <a:avLst/>
+          </a:prstGeom>
+        </p:spPr>
+        <p:txBody>
+          <a:bodyPr vert="horz" lIns="91440" tIns="45720" rIns="91440" bIns="45720" rtlCol="0" anchor="b"/>
+          <a:lstStyle>
+            <a:lvl1pPr algn="l">
+              <a:defRPr sz="1200"/>
+            </a:lvl1pPr>
+          </a:lstStyle>
+          <a:p>
+            <a:endParaRPr lang="da-DK"/>
+          </a:p>
+        </p:txBody>
+      </p:sp>
+      <p:sp>
+        <p:nvSpPr>
+          <p:cNvPr id="7" name="Pladsholder til slidenummer 6"/>
+          <p:cNvSpPr>
+            <a:spLocks noGrp="1"/>
+          </p:cNvSpPr>
+          <p:nvPr>
+            <p:ph type="sldNum" sz="quarter" idx="5"/>
+          </p:nvPr>
+        </p:nvSpPr>
+        <p:spPr>
+          <a:xfrm>
+            <a:off x="3884613" y="8685213"/>
+            <a:ext cx="2971800" cy="458787"/>
+          </a:xfrm>
+          <a:prstGeom prst="rect">
+            <a:avLst/>
+          </a:prstGeom>
+        </p:spPr>
+        <p:txBody>
+          <a:bodyPr vert="horz" lIns="91440" tIns="45720" rIns="91440" bIns="45720" rtlCol="0" anchor="b"/>
+          <a:lstStyle>
+            <a:lvl1pPr algn="r">
+              <a:defRPr sz="1200"/>
+            </a:lvl1pPr>
+          </a:lstStyle>
+          <a:p>
+            <a:fld id="{AB48E9B3-BD9D-47BF-86A1-185792784468}" type="slidenum">
+              <a:rPr lang="da-DK" smtClean="0"/>
+              <a:t>‹nr.›</a:t>
+            </a:fld>
+            <a:endParaRPr lang="da-DK"/>
+          </a:p>
+        </p:txBody>
+      </p:sp>
+    </p:spTree>
+    <p:extLst>
+      <p:ext uri="{BB962C8B-B14F-4D97-AF65-F5344CB8AC3E}">
+        <p14:creationId xmlns:p14="http://schemas.microsoft.com/office/powerpoint/2010/main" val="829341893"/>
+      </p:ext>
+    </p:extLst>
+  </p:cSld>
+  <p:clrMap bg1="lt1" tx1="dk1" bg2="lt2" tx2="dk2" accent1="accent1" accent2="accent2" accent3="accent3" accent4="accent4" accent5="accent5" accent6="accent6" hlink="hlink" folHlink="folHlink"/>
+  <p:notesStyle>
+    <a:lvl1pPr marL="0" algn="l" defTabSz="914400" rtl="0" eaLnBrk="1" latinLnBrk="0" hangingPunct="1">
+      <a:defRPr sz="1200" kern="1200">
+        <a:solidFill>
+          <a:schemeClr val="tx1"/>
+        </a:solidFill>
+        <a:latin typeface="+mn-lt"/>
+        <a:ea typeface="+mn-ea"/>
+        <a:cs typeface="+mn-cs"/>
+      </a:defRPr>
+    </a:lvl1pPr>
+    <a:lvl2pPr marL="457200" algn="l" defTabSz="914400" rtl="0" eaLnBrk="1" latinLnBrk="0" hangingPunct="1">
+      <a:defRPr sz="1200" kern="1200">
+        <a:solidFill>
+          <a:schemeClr val="tx1"/>
+        </a:solidFill>
+        <a:latin typeface="+mn-lt"/>
+        <a:ea typeface="+mn-ea"/>
+        <a:cs typeface="+mn-cs"/>
+      </a:defRPr>
+    </a:lvl2pPr>
+    <a:lvl3pPr marL="914400" algn="l" defTabSz="914400" rtl="0" eaLnBrk="1" latinLnBrk="0" hangingPunct="1">
+      <a:defRPr sz="1200" kern="1200">
+        <a:solidFill>
+          <a:schemeClr val="tx1"/>
+        </a:solidFill>
+        <a:latin typeface="+mn-lt"/>
+        <a:ea typeface="+mn-ea"/>
+        <a:cs typeface="+mn-cs"/>
+      </a:defRPr>
+    </a:lvl3pPr>
+    <a:lvl4pPr marL="1371600" algn="l" defTabSz="914400" rtl="0" eaLnBrk="1" latinLnBrk="0" hangingPunct="1">
+      <a:defRPr sz="1200" kern="1200">
+        <a:solidFill>
+          <a:schemeClr val="tx1"/>
+        </a:solidFill>
+        <a:latin typeface="+mn-lt"/>
+        <a:ea typeface="+mn-ea"/>
+        <a:cs typeface="+mn-cs"/>
+      </a:defRPr>
+    </a:lvl4pPr>
+    <a:lvl5pPr marL="1828800" algn="l" defTabSz="914400" rtl="0" eaLnBrk="1" latinLnBrk="0" hangingPunct="1">
+      <a:defRPr sz="1200" kern="1200">
+        <a:solidFill>
+          <a:schemeClr val="tx1"/>
+        </a:solidFill>
+        <a:latin typeface="+mn-lt"/>
+        <a:ea typeface="+mn-ea"/>
+        <a:cs typeface="+mn-cs"/>
+      </a:defRPr>
+    </a:lvl5pPr>
+    <a:lvl6pPr marL="2286000" algn="l" defTabSz="914400" rtl="0" eaLnBrk="1" latinLnBrk="0" hangingPunct="1">
+      <a:defRPr sz="1200" kern="1200">
+        <a:solidFill>
+          <a:schemeClr val="tx1"/>
+        </a:solidFill>
+        <a:latin typeface="+mn-lt"/>
+        <a:ea typeface="+mn-ea"/>
+        <a:cs typeface="+mn-cs"/>
+      </a:defRPr>
+    </a:lvl6pPr>
+    <a:lvl7pPr marL="2743200" algn="l" defTabSz="914400" rtl="0" eaLnBrk="1" latinLnBrk="0" hangingPunct="1">
+      <a:defRPr sz="1200" kern="1200">
+        <a:solidFill>
+          <a:schemeClr val="tx1"/>
+        </a:solidFill>
+        <a:latin typeface="+mn-lt"/>
+        <a:ea typeface="+mn-ea"/>
+        <a:cs typeface="+mn-cs"/>
+      </a:defRPr>
+    </a:lvl7pPr>
+    <a:lvl8pPr marL="3200400" algn="l" defTabSz="914400" rtl="0" eaLnBrk="1" latinLnBrk="0" hangingPunct="1">
+      <a:defRPr sz="1200" kern="1200">
+        <a:solidFill>
+          <a:schemeClr val="tx1"/>
+        </a:solidFill>
+        <a:latin typeface="+mn-lt"/>
+        <a:ea typeface="+mn-ea"/>
+        <a:cs typeface="+mn-cs"/>
+      </a:defRPr>
+    </a:lvl8pPr>
+    <a:lvl9pPr marL="3657600" algn="l" defTabSz="914400" rtl="0" eaLnBrk="1" latinLnBrk="0" hangingPunct="1">
+      <a:defRPr sz="1200" kern="1200">
+        <a:solidFill>
+          <a:schemeClr val="tx1"/>
+        </a:solidFill>
+        <a:latin typeface="+mn-lt"/>
+        <a:ea typeface="+mn-ea"/>
+        <a:cs typeface="+mn-cs"/>
+      </a:defRPr>
+    </a:lvl9pPr>
+  </p:notesStyle>
+</p:notesMaster>
+</file>
+
+<file path=ppt/notesSlides/notesSlide1.xml><?xml version="1.0" encoding="utf-8"?>
+<p:notes xmlns:a="http://schemas.openxmlformats.org/drawingml/2006/main" xmlns:r="http://schemas.openxmlformats.org/officeDocument/2006/relationships" xmlns:p="http://schemas.openxmlformats.org/presentationml/2006/main">
+  <p:cSld>
+    <p:spTree>
+      <p:nvGrpSpPr>
+        <p:cNvPr id="1" name=""/>
+        <p:cNvGrpSpPr/>
+        <p:nvPr/>
+      </p:nvGrpSpPr>
+      <p:grpSpPr>
+        <a:xfrm>
+          <a:off x="0" y="0"/>
+          <a:ext cx="0" cy="0"/>
+          <a:chOff x="0" y="0"/>
+          <a:chExt cx="0" cy="0"/>
+        </a:xfrm>
+      </p:grpSpPr>
+      <p:sp>
+        <p:nvSpPr>
+          <p:cNvPr id="2" name="Pladsholder til slidebillede 1"/>
+          <p:cNvSpPr>
+            <a:spLocks noGrp="1" noRot="1" noChangeAspect="1"/>
+          </p:cNvSpPr>
+          <p:nvPr>
+            <p:ph type="sldImg"/>
+          </p:nvPr>
+        </p:nvSpPr>
+        <p:spPr/>
+      </p:sp>
+      <p:sp>
+        <p:nvSpPr>
+          <p:cNvPr id="3" name="Pladsholder til noter 2"/>
+          <p:cNvSpPr>
+            <a:spLocks noGrp="1"/>
+          </p:cNvSpPr>
+          <p:nvPr>
+            <p:ph type="body" idx="1"/>
+          </p:nvPr>
+        </p:nvSpPr>
+        <p:spPr/>
+        <p:txBody>
+          <a:bodyPr/>
+          <a:lstStyle/>
+          <a:p>
+            <a:r>
+              <a:rPr lang="da-DK" dirty="0" smtClean="0"/>
+              <a:t>Der</a:t>
+            </a:r>
+            <a:r>
+              <a:rPr lang="da-DK" baseline="0" dirty="0" smtClean="0"/>
+              <a:t> er to typer strukturer med </a:t>
+            </a:r>
+            <a:r>
+              <a:rPr lang="da-DK" baseline="0" dirty="0" err="1" smtClean="0"/>
+              <a:t>composite</a:t>
+            </a:r>
+            <a:r>
+              <a:rPr lang="da-DK" baseline="0" dirty="0" smtClean="0"/>
+              <a:t> pattern som kan ses her. Den første struktur er der en default klasse hvor implementeringen er i både component og </a:t>
+            </a:r>
+            <a:r>
+              <a:rPr lang="da-DK" baseline="0" dirty="0" err="1" smtClean="0"/>
+              <a:t>composite</a:t>
+            </a:r>
+            <a:r>
+              <a:rPr lang="da-DK" baseline="0" dirty="0" smtClean="0"/>
+              <a:t> hvorledes hvis der ikke er en metode implementeret i </a:t>
+            </a:r>
+            <a:r>
+              <a:rPr lang="da-DK" baseline="0" dirty="0" err="1" smtClean="0"/>
+              <a:t>composite</a:t>
+            </a:r>
+            <a:r>
+              <a:rPr lang="da-DK" baseline="0" dirty="0" smtClean="0"/>
+              <a:t>, så bliver der kastet en </a:t>
+            </a:r>
+            <a:r>
+              <a:rPr lang="da-DK" baseline="0" dirty="0" err="1" smtClean="0"/>
+              <a:t>exception</a:t>
+            </a:r>
+            <a:r>
+              <a:rPr lang="da-DK" baseline="0" dirty="0" smtClean="0"/>
+              <a:t> fra component. Hvis </a:t>
+            </a:r>
+            <a:r>
+              <a:rPr lang="da-DK" baseline="0" dirty="0" err="1" smtClean="0"/>
+              <a:t>composite</a:t>
+            </a:r>
+            <a:r>
+              <a:rPr lang="da-DK" baseline="0" dirty="0" smtClean="0"/>
+              <a:t> bliver kaldt med den metode der lægger i component. Den anden struktur er type sikker fordi at metoderne er delt op i </a:t>
+            </a:r>
+            <a:r>
+              <a:rPr lang="da-DK" baseline="0" dirty="0" err="1" smtClean="0"/>
+              <a:t>Composite</a:t>
+            </a:r>
+            <a:r>
+              <a:rPr lang="da-DK" baseline="0" dirty="0" smtClean="0"/>
+              <a:t> og Leaf, dvs. at de ikke får noget nedarvet fra Component som ikke er implementeret hvilket der ikke kan blive kaldt noget.</a:t>
+            </a:r>
+            <a:endParaRPr lang="da-DK" dirty="0"/>
+          </a:p>
+        </p:txBody>
+      </p:sp>
+      <p:sp>
+        <p:nvSpPr>
+          <p:cNvPr id="4" name="Pladsholder til slidenummer 3"/>
+          <p:cNvSpPr>
+            <a:spLocks noGrp="1"/>
+          </p:cNvSpPr>
+          <p:nvPr>
+            <p:ph type="sldNum" sz="quarter" idx="10"/>
+          </p:nvPr>
+        </p:nvSpPr>
+        <p:spPr/>
+        <p:txBody>
+          <a:bodyPr/>
+          <a:lstStyle/>
+          <a:p>
+            <a:fld id="{AB48E9B3-BD9D-47BF-86A1-185792784468}" type="slidenum">
+              <a:rPr lang="da-DK" smtClean="0"/>
+              <a:t>2</a:t>
+            </a:fld>
+            <a:endParaRPr lang="da-DK"/>
+          </a:p>
+        </p:txBody>
+      </p:sp>
+    </p:spTree>
+    <p:extLst>
+      <p:ext uri="{BB962C8B-B14F-4D97-AF65-F5344CB8AC3E}">
+        <p14:creationId xmlns:p14="http://schemas.microsoft.com/office/powerpoint/2010/main" val="2074268150"/>
+      </p:ext>
+    </p:extLst>
+  </p:cSld>
+  <p:clrMapOvr>
+    <a:masterClrMapping/>
+  </p:clrMapOvr>
+</p:notes>
 </file>
 
 <file path=ppt/slideLayouts/slideLayout1.xml><?xml version="1.0" encoding="utf-8"?>
@@ -3123,7 +3616,7 @@
           </p:nvPr>
         </p:nvPicPr>
         <p:blipFill>
-          <a:blip r:embed="rId2"/>
+          <a:blip r:embed="rId3"/>
           <a:stretch>
             <a:fillRect/>
           </a:stretch>
@@ -3273,47 +3766,9 @@
           <a:chExt cx="0" cy="0"/>
         </a:xfrm>
       </p:grpSpPr>
-      <p:sp>
-        <p:nvSpPr>
-          <p:cNvPr id="2" name="Titel 1">
-            <a:extLst>
-              <a:ext uri="{FF2B5EF4-FFF2-40B4-BE49-F238E27FC236}">
-                <a16:creationId xmlns:a16="http://schemas.microsoft.com/office/drawing/2014/main" xmlns="" id="{8AFA5085-7572-4CF2-A06B-7BE2E4F4FA13}"/>
-              </a:ext>
-            </a:extLst>
-          </p:cNvPr>
-          <p:cNvSpPr>
-            <a:spLocks noGrp="1"/>
-          </p:cNvSpPr>
-          <p:nvPr>
-            <p:ph type="title"/>
-          </p:nvPr>
-        </p:nvSpPr>
-        <p:spPr/>
-        <p:txBody>
-          <a:bodyPr/>
-          <a:lstStyle/>
-          <a:p>
-            <a:r>
-              <a:rPr lang="da-DK" dirty="0" err="1"/>
-              <a:t>Sequence</a:t>
-            </a:r>
-            <a:r>
-              <a:rPr lang="da-DK" dirty="0"/>
-              <a:t> diagram</a:t>
-            </a:r>
-          </a:p>
-        </p:txBody>
-      </p:sp>
       <p:pic>
         <p:nvPicPr>
-          <p:cNvPr id="4" name="Pladsholder til indhold 3">
-            <a:extLst>
-              <a:ext uri="{FF2B5EF4-FFF2-40B4-BE49-F238E27FC236}">
-                <a16:creationId xmlns:a16="http://schemas.microsoft.com/office/drawing/2014/main" xmlns="" id="{5C11F194-7370-4F87-9FA5-E3D871D39865}"/>
-              </a:ext>
-            </a:extLst>
-          </p:cNvPr>
+          <p:cNvPr id="4" name="Pladsholder til indhold 3"/>
           <p:cNvPicPr>
             <a:picLocks noGrp="1" noChangeAspect="1"/>
           </p:cNvPicPr>
@@ -3329,18 +3784,45 @@
         </p:blipFill>
         <p:spPr>
           <a:xfrm>
-            <a:off x="2872445" y="1825625"/>
-            <a:ext cx="6447109" cy="4351338"/>
+            <a:off x="1365897" y="787652"/>
+            <a:ext cx="8480739" cy="5579434"/>
           </a:xfrm>
           <a:prstGeom prst="rect">
             <a:avLst/>
           </a:prstGeom>
         </p:spPr>
       </p:pic>
+      <p:sp>
+        <p:nvSpPr>
+          <p:cNvPr id="2" name="Titel 1"/>
+          <p:cNvSpPr>
+            <a:spLocks noGrp="1"/>
+          </p:cNvSpPr>
+          <p:nvPr>
+            <p:ph type="title"/>
+          </p:nvPr>
+        </p:nvSpPr>
+        <p:spPr/>
+        <p:txBody>
+          <a:bodyPr/>
+          <a:lstStyle/>
+          <a:p>
+            <a:r>
+              <a:rPr lang="da-DK" dirty="0" smtClean="0"/>
+              <a:t>Tree </a:t>
+            </a:r>
+            <a:r>
+              <a:rPr lang="da-DK" dirty="0" err="1" smtClean="0"/>
+              <a:t>structure</a:t>
+            </a:r>
+            <a:endParaRPr lang="da-DK" dirty="0"/>
+          </a:p>
+        </p:txBody>
+      </p:sp>
     </p:spTree>
     <p:extLst>
       <p:ext uri="{BB962C8B-B14F-4D97-AF65-F5344CB8AC3E}">
-        <p14:creationId xmlns:p14="http://schemas.microsoft.com/office/powerpoint/2010/main" val="1546812545"/>
+        <p14:creationId xmlns:p14="http://schemas.microsoft.com/office/powerpoint/2010/main" val="2271857919"/>
       </p:ext>
     </p:extLst>
   </p:cSld>
@@ -3580,8 +4062,20 @@
               <a:t> backs: Bad if wanting to </a:t>
             </a:r>
             <a:r>
-              <a:rPr lang="da-DK" dirty="0" err="1"/>
+              <a:rPr lang="da-DK" dirty="0" err="1" smtClean="0"/>
               <a:t>extend</a:t>
+            </a:r>
+            <a:r>
+              <a:rPr lang="da-DK" dirty="0" smtClean="0"/>
+              <a:t> (new </a:t>
+            </a:r>
+            <a:r>
+              <a:rPr lang="da-DK" dirty="0" err="1" smtClean="0"/>
+              <a:t>methods</a:t>
+            </a:r>
+            <a:r>
+              <a:rPr lang="da-DK" dirty="0" smtClean="0"/>
+              <a:t>)</a:t>
             </a:r>
             <a:endParaRPr lang="da-DK" dirty="0"/>
           </a:p>
@@ -3866,4 +4360,265 @@
     </a:ext>
   </a:extLst>
 </a:theme>
+</file>
+
+<file path=ppt/theme/theme2.xml><?xml version="1.0" encoding="utf-8"?>
+<a:theme xmlns:a="http://schemas.openxmlformats.org/drawingml/2006/main" name="Office-tema">
+  <a:themeElements>
+    <a:clrScheme name="Kontor">
+      <a:dk1>
+        <a:sysClr val="windowText" lastClr="000000"/>
+      </a:dk1>
+      <a:lt1>
+        <a:sysClr val="window" lastClr="FFFFFF"/>
+      </a:lt1>
+      <a:dk2>
+        <a:srgbClr val="44546A"/>
+      </a:dk2>
+      <a:lt2>
+        <a:srgbClr val="E7E6E6"/>
+      </a:lt2>
+      <a:accent1>
+        <a:srgbClr val="5B9BD5"/>
+      </a:accent1>
+      <a:accent2>
+        <a:srgbClr val="ED7D31"/>
+      </a:accent2>
+      <a:accent3>
+        <a:srgbClr val="A5A5A5"/>
+      </a:accent3>
+      <a:accent4>
+        <a:srgbClr val="FFC000"/>
+      </a:accent4>
+      <a:accent5>
+        <a:srgbClr val="4472C4"/>
+      </a:accent5>
+      <a:accent6>
+        <a:srgbClr val="70AD47"/>
+      </a:accent6>
+      <a:hlink>
+        <a:srgbClr val="0563C1"/>
+      </a:hlink>
+      <a:folHlink>
+        <a:srgbClr val="954F72"/>
+      </a:folHlink>
+    </a:clrScheme>
+    <a:fontScheme name="Kontor">
+      <a:majorFont>
+        <a:latin typeface="Calibri Light" panose="020F0302020204030204"/>
+        <a:ea typeface=""/>
+        <a:cs typeface=""/>
+        <a:font script="Jpan" typeface="ＭＳ Ｐゴシック"/>
+        <a:font script="Hang" typeface="맑은 고딕"/>
+        <a:font script="Hans" typeface="宋体"/>
+        <a:font script="Hant" typeface="新細明體"/>
+        <a:font script="Arab" typeface="Times New Roman"/>
+        <a:font script="Hebr" typeface="Times New Roman"/>
+        <a:font script="Thai" typeface="Angsana New"/>
+        <a:font script="Ethi" typeface="Nyala"/>
+        <a:font script="Beng" typeface="Vrinda"/>
+        <a:font script="Gujr" typeface="Shruti"/>
+        <a:font script="Khmr" typeface="MoolBoran"/>
+        <a:font script="Knda" typeface="Tunga"/>
+        <a:font script="Guru" typeface="Raavi"/>
+        <a:font script="Cans" typeface="Euphemia"/>
+        <a:font script="Cher" typeface="Plantagenet Cherokee"/>
+        <a:font script="Yiii" typeface="Microsoft Yi Baiti"/>
+        <a:font script="Tibt" typeface="Microsoft Himalaya"/>
+        <a:font script="Thaa" typeface="MV Boli"/>
+        <a:font script="Deva" typeface="Mangal"/>
+        <a:font script="Telu" typeface="Gautami"/>
+        <a:font script="Taml" typeface="Latha"/>
+        <a:font script="Syrc" typeface="Estrangelo Edessa"/>
+        <a:font script="Orya" typeface="Kalinga"/>
+        <a:font script="Mlym" typeface="Kartika"/>
+        <a:font script="Laoo" typeface="DokChampa"/>
+        <a:font script="Sinh" typeface="Iskoola Pota"/>
+        <a:font script="Mong" typeface="Mongolian Baiti"/>
+        <a:font script="Viet" typeface="Times New Roman"/>
+        <a:font script="Uigh" typeface="Microsoft Uighur"/>
+        <a:font script="Geor" typeface="Sylfaen"/>
+      </a:majorFont>
+      <a:minorFont>
+        <a:latin typeface="Calibri" panose="020F0502020204030204"/>
+        <a:ea typeface=""/>
+        <a:cs typeface=""/>
+        <a:font script="Jpan" typeface="ＭＳ Ｐゴシック"/>
+        <a:font script="Hang" typeface="맑은 고딕"/>
+        <a:font script="Hans" typeface="宋体"/>
+        <a:font script="Hant" typeface="新細明體"/>
+        <a:font script="Arab" typeface="Arial"/>
+        <a:font script="Hebr" typeface="Arial"/>
+        <a:font script="Thai" typeface="Cordia New"/>
+        <a:font script="Ethi" typeface="Nyala"/>
+        <a:font script="Beng" typeface="Vrinda"/>
+        <a:font script="Gujr" typeface="Shruti"/>
+        <a:font script="Khmr" typeface="DaunPenh"/>
+        <a:font script="Knda" typeface="Tunga"/>
+        <a:font script="Guru" typeface="Raavi"/>
+        <a:font script="Cans" typeface="Euphemia"/>
+        <a:font script="Cher" typeface="Plantagenet Cherokee"/>
+        <a:font script="Yiii" typeface="Microsoft Yi Baiti"/>
+        <a:font script="Tibt" typeface="Microsoft Himalaya"/>
+        <a:font script="Thaa" typeface="MV Boli"/>
+        <a:font script="Deva" typeface="Mangal"/>
+        <a:font script="Telu" typeface="Gautami"/>
+        <a:font script="Taml" typeface="Latha"/>
+        <a:font script="Syrc" typeface="Estrangelo Edessa"/>
+        <a:font script="Orya" typeface="Kalinga"/>
+        <a:font script="Mlym" typeface="Kartika"/>
+        <a:font script="Laoo" typeface="DokChampa"/>
+        <a:font script="Sinh" typeface="Iskoola Pota"/>
+        <a:font script="Mong" typeface="Mongolian Baiti"/>
+        <a:font script="Viet" typeface="Arial"/>
+        <a:font script="Uigh" typeface="Microsoft Uighur"/>
+        <a:font script="Geor" typeface="Sylfaen"/>
+      </a:minorFont>
+    </a:fontScheme>
+    <a:fmtScheme name="Kontor">
+      <a:fillStyleLst>
+        <a:solidFill>
+          <a:schemeClr val="phClr"/>
+        </a:solidFill>
+        <a:gradFill rotWithShape="1">
+          <a:gsLst>
+            <a:gs pos="0">
+              <a:schemeClr val="phClr">
+                <a:lumMod val="110000"/>
+                <a:satMod val="105000"/>
+                <a:tint val="67000"/>
+              </a:schemeClr>
+            </a:gs>
+            <a:gs pos="50000">
+              <a:schemeClr val="phClr">
+                <a:lumMod val="105000"/>
+                <a:satMod val="103000"/>
+                <a:tint val="73000"/>
+              </a:schemeClr>
+            </a:gs>
+            <a:gs pos="100000">
+              <a:schemeClr val="phClr">
+                <a:lumMod val="105000"/>
+                <a:satMod val="109000"/>
+                <a:tint val="81000"/>
+              </a:schemeClr>
+            </a:gs>
+          </a:gsLst>
+          <a:lin ang="5400000" scaled="0"/>
+        </a:gradFill>
+        <a:gradFill rotWithShape="1">
+          <a:gsLst>
+            <a:gs pos="0">
+              <a:schemeClr val="phClr">
+                <a:satMod val="103000"/>
+                <a:lumMod val="102000"/>
+                <a:tint val="94000"/>
+              </a:schemeClr>
+            </a:gs>
+            <a:gs pos="50000">
+              <a:schemeClr val="phClr">
+                <a:satMod val="110000"/>
+                <a:lumMod val="100000"/>
+                <a:shade val="100000"/>
+              </a:schemeClr>
+            </a:gs>
+            <a:gs pos="100000">
+              <a:schemeClr val="phClr">
+                <a:lumMod val="99000"/>
+                <a:satMod val="120000"/>
+                <a:shade val="78000"/>
+              </a:schemeClr>
+            </a:gs>
+          </a:gsLst>
+          <a:lin ang="5400000" scaled="0"/>
+        </a:gradFill>
+      </a:fillStyleLst>
+      <a:lnStyleLst>
+        <a:ln w="6350" cap="flat" cmpd="sng" algn="ctr">
+          <a:solidFill>
+            <a:schemeClr val="phClr"/>
+          </a:solidFill>
+          <a:prstDash val="solid"/>
+          <a:miter lim="800000"/>
+        </a:ln>
+        <a:ln w="12700" cap="flat" cmpd="sng" algn="ctr">
+          <a:solidFill>
+            <a:schemeClr val="phClr"/>
+          </a:solidFill>
+          <a:prstDash val="solid"/>
+          <a:miter lim="800000"/>
+        </a:ln>
+        <a:ln w="19050" cap="flat" cmpd="sng" algn="ctr">
+          <a:solidFill>
+            <a:schemeClr val="phClr"/>
+          </a:solidFill>
+          <a:prstDash val="solid"/>
+          <a:miter lim="800000"/>
+        </a:ln>
+      </a:lnStyleLst>
+      <a:effectStyleLst>
+        <a:effectStyle>
+          <a:effectLst/>
+        </a:effectStyle>
+        <a:effectStyle>
+          <a:effectLst/>
+        </a:effectStyle>
+        <a:effectStyle>
+          <a:effectLst>
+            <a:outerShdw blurRad="57150" dist="19050" dir="5400000" algn="ctr" rotWithShape="0">
+              <a:srgbClr val="000000">
+                <a:alpha val="63000"/>
+              </a:srgbClr>
+            </a:outerShdw>
+          </a:effectLst>
+        </a:effectStyle>
+      </a:effectStyleLst>
+      <a:bgFillStyleLst>
+        <a:solidFill>
+          <a:schemeClr val="phClr"/>
+        </a:solidFill>
+        <a:solidFill>
+          <a:schemeClr val="phClr">
+            <a:tint val="95000"/>
+            <a:satMod val="170000"/>
+          </a:schemeClr>
+        </a:solidFill>
+        <a:gradFill rotWithShape="1">
+          <a:gsLst>
+            <a:gs pos="0">
+              <a:schemeClr val="phClr">
+                <a:tint val="93000"/>
+                <a:satMod val="150000"/>
+                <a:shade val="98000"/>
+                <a:lumMod val="102000"/>
+              </a:schemeClr>
+            </a:gs>
+            <a:gs pos="50000">
+              <a:schemeClr val="phClr">
+                <a:tint val="98000"/>
+                <a:satMod val="130000"/>
+                <a:shade val="90000"/>
+                <a:lumMod val="103000"/>
+              </a:schemeClr>
+            </a:gs>
+            <a:gs pos="100000">
+              <a:schemeClr val="phClr">
+                <a:shade val="63000"/>
+                <a:satMod val="120000"/>
+              </a:schemeClr>
+            </a:gs>
+          </a:gsLst>
+          <a:lin ang="5400000" scaled="0"/>
+        </a:gradFill>
+      </a:bgFillStyleLst>
+    </a:fmtScheme>
+  </a:themeElements>
+  <a:objectDefaults/>
+  <a:extraClrSchemeLst/>
+  <a:extLst>
+    <a:ext uri="{05A4C25C-085E-4340-85A3-A5531E510DB2}">
+      <thm15:themeFamily xmlns:thm15="http://schemas.microsoft.com/office/thememl/2012/main" name="Office Theme" id="{62F939B6-93AF-4DB8-9C6B-D6C7DFDC589F}" vid="{4A3C46E8-61CC-4603-A589-7422A47A8E4A}"/>
+    </a:ext>
+  </a:extLst>
+</a:theme>
 </file>
</xml_diff>

<commit_message>
Ændrede rækkefølge i ppt
</commit_message>
<xml_diff>
--- a/Aflevering 3/Navy Structure Composite Pattern.pptx
+++ b/Aflevering 3/Navy Structure Composite Pattern.pptx
@@ -4,16 +4,14 @@
   <p:sldMasterIdLst>
     <p:sldMasterId id="2147483648" r:id="rId1"/>
   </p:sldMasterIdLst>
-  <p:notesMasterIdLst>
-    <p:notesMasterId r:id="rId8"/>
-  </p:notesMasterIdLst>
   <p:sldIdLst>
     <p:sldId id="256" r:id="rId2"/>
     <p:sldId id="257" r:id="rId3"/>
     <p:sldId id="258" r:id="rId4"/>
-    <p:sldId id="262" r:id="rId5"/>
-    <p:sldId id="261" r:id="rId6"/>
-    <p:sldId id="260" r:id="rId7"/>
+    <p:sldId id="261" r:id="rId5"/>
+    <p:sldId id="259" r:id="rId6"/>
+    <p:sldId id="262" r:id="rId7"/>
+    <p:sldId id="260" r:id="rId8"/>
   </p:sldIdLst>
   <p:sldSz cx="12192000" cy="6858000"/>
   <p:notesSz cx="6858000" cy="9144000"/>
@@ -120,496 +118,6 @@
 </p:presentation>
 </file>
 
-<file path=ppt/notesMasters/notesMaster1.xml><?xml version="1.0" encoding="utf-8"?>
-<p:notesMaster xmlns:a="http://schemas.openxmlformats.org/drawingml/2006/main" xmlns:r="http://schemas.openxmlformats.org/officeDocument/2006/relationships" xmlns:p="http://schemas.openxmlformats.org/presentationml/2006/main">
-  <p:cSld>
-    <p:bg>
-      <p:bgRef idx="1001">
-        <a:schemeClr val="bg1"/>
-      </p:bgRef>
-    </p:bg>
-    <p:spTree>
-      <p:nvGrpSpPr>
-        <p:cNvPr id="1" name=""/>
-        <p:cNvGrpSpPr/>
-        <p:nvPr/>
-      </p:nvGrpSpPr>
-      <p:grpSpPr>
-        <a:xfrm>
-          <a:off x="0" y="0"/>
-          <a:ext cx="0" cy="0"/>
-          <a:chOff x="0" y="0"/>
-          <a:chExt cx="0" cy="0"/>
-        </a:xfrm>
-      </p:grpSpPr>
-      <p:sp>
-        <p:nvSpPr>
-          <p:cNvPr id="2" name="Pladsholder til sidehoved 1"/>
-          <p:cNvSpPr>
-            <a:spLocks noGrp="1"/>
-          </p:cNvSpPr>
-          <p:nvPr>
-            <p:ph type="hdr" sz="quarter"/>
-          </p:nvPr>
-        </p:nvSpPr>
-        <p:spPr>
-          <a:xfrm>
-            <a:off x="0" y="0"/>
-            <a:ext cx="2971800" cy="458788"/>
-          </a:xfrm>
-          <a:prstGeom prst="rect">
-            <a:avLst/>
-          </a:prstGeom>
-        </p:spPr>
-        <p:txBody>
-          <a:bodyPr vert="horz" lIns="91440" tIns="45720" rIns="91440" bIns="45720" rtlCol="0"/>
-          <a:lstStyle>
-            <a:lvl1pPr algn="l">
-              <a:defRPr sz="1200"/>
-            </a:lvl1pPr>
-          </a:lstStyle>
-          <a:p>
-            <a:endParaRPr lang="da-DK"/>
-          </a:p>
-        </p:txBody>
-      </p:sp>
-      <p:sp>
-        <p:nvSpPr>
-          <p:cNvPr id="3" name="Pladsholder til dato 2"/>
-          <p:cNvSpPr>
-            <a:spLocks noGrp="1"/>
-          </p:cNvSpPr>
-          <p:nvPr>
-            <p:ph type="dt" idx="1"/>
-          </p:nvPr>
-        </p:nvSpPr>
-        <p:spPr>
-          <a:xfrm>
-            <a:off x="3884613" y="0"/>
-            <a:ext cx="2971800" cy="458788"/>
-          </a:xfrm>
-          <a:prstGeom prst="rect">
-            <a:avLst/>
-          </a:prstGeom>
-        </p:spPr>
-        <p:txBody>
-          <a:bodyPr vert="horz" lIns="91440" tIns="45720" rIns="91440" bIns="45720" rtlCol="0"/>
-          <a:lstStyle>
-            <a:lvl1pPr algn="r">
-              <a:defRPr sz="1200"/>
-            </a:lvl1pPr>
-          </a:lstStyle>
-          <a:p>
-            <a:fld id="{026C999E-74FC-4E51-88FB-E37BCA41C109}" type="datetimeFigureOut">
-              <a:rPr lang="da-DK" smtClean="0"/>
-              <a:t>13-04-2018</a:t>
-            </a:fld>
-            <a:endParaRPr lang="da-DK"/>
-          </a:p>
-        </p:txBody>
-      </p:sp>
-      <p:sp>
-        <p:nvSpPr>
-          <p:cNvPr id="4" name="Pladsholder til slidebillede 3"/>
-          <p:cNvSpPr>
-            <a:spLocks noGrp="1" noRot="1" noChangeAspect="1"/>
-          </p:cNvSpPr>
-          <p:nvPr>
-            <p:ph type="sldImg" idx="2"/>
-          </p:nvPr>
-        </p:nvSpPr>
-        <p:spPr>
-          <a:xfrm>
-            <a:off x="685800" y="1143000"/>
-            <a:ext cx="5486400" cy="3086100"/>
-          </a:xfrm>
-          <a:prstGeom prst="rect">
-            <a:avLst/>
-          </a:prstGeom>
-          <a:noFill/>
-          <a:ln w="12700">
-            <a:solidFill>
-              <a:prstClr val="black"/>
-            </a:solidFill>
-          </a:ln>
-        </p:spPr>
-        <p:txBody>
-          <a:bodyPr vert="horz" lIns="91440" tIns="45720" rIns="91440" bIns="45720" rtlCol="0" anchor="ctr"/>
-          <a:lstStyle/>
-          <a:p>
-            <a:endParaRPr lang="da-DK"/>
-          </a:p>
-        </p:txBody>
-      </p:sp>
-      <p:sp>
-        <p:nvSpPr>
-          <p:cNvPr id="5" name="Pladsholder til noter 4"/>
-          <p:cNvSpPr>
-            <a:spLocks noGrp="1"/>
-          </p:cNvSpPr>
-          <p:nvPr>
-            <p:ph type="body" sz="quarter" idx="3"/>
-          </p:nvPr>
-        </p:nvSpPr>
-        <p:spPr>
-          <a:xfrm>
-            <a:off x="685800" y="4400550"/>
-            <a:ext cx="5486400" cy="3600450"/>
-          </a:xfrm>
-          <a:prstGeom prst="rect">
-            <a:avLst/>
-          </a:prstGeom>
-        </p:spPr>
-        <p:txBody>
-          <a:bodyPr vert="horz" lIns="91440" tIns="45720" rIns="91440" bIns="45720" rtlCol="0"/>
-          <a:lstStyle/>
-          <a:p>
-            <a:pPr lvl="0"/>
-            <a:r>
-              <a:rPr lang="da-DK" smtClean="0"/>
-              <a:t>Klik for at redigere i master</a:t>
-            </a:r>
-          </a:p>
-          <a:p>
-            <a:pPr lvl="1"/>
-            <a:r>
-              <a:rPr lang="da-DK" smtClean="0"/>
-              <a:t>Andet niveau</a:t>
-            </a:r>
-          </a:p>
-          <a:p>
-            <a:pPr lvl="2"/>
-            <a:r>
-              <a:rPr lang="da-DK" smtClean="0"/>
-              <a:t>Tredje niveau</a:t>
-            </a:r>
-          </a:p>
-          <a:p>
-            <a:pPr lvl="3"/>
-            <a:r>
-              <a:rPr lang="da-DK" smtClean="0"/>
-              <a:t>Fjerde niveau</a:t>
-            </a:r>
-          </a:p>
-          <a:p>
-            <a:pPr lvl="4"/>
-            <a:r>
-              <a:rPr lang="da-DK" smtClean="0"/>
-              <a:t>Femte niveau</a:t>
-            </a:r>
-            <a:endParaRPr lang="da-DK"/>
-          </a:p>
-        </p:txBody>
-      </p:sp>
-      <p:sp>
-        <p:nvSpPr>
-          <p:cNvPr id="6" name="Pladsholder til sidefod 5"/>
-          <p:cNvSpPr>
-            <a:spLocks noGrp="1"/>
-          </p:cNvSpPr>
-          <p:nvPr>
-            <p:ph type="ftr" sz="quarter" idx="4"/>
-          </p:nvPr>
-        </p:nvSpPr>
-        <p:spPr>
-          <a:xfrm>
-            <a:off x="0" y="8685213"/>
-            <a:ext cx="2971800" cy="458787"/>
-          </a:xfrm>
-          <a:prstGeom prst="rect">
-            <a:avLst/>
-          </a:prstGeom>
-        </p:spPr>
-        <p:txBody>
-          <a:bodyPr vert="horz" lIns="91440" tIns="45720" rIns="91440" bIns="45720" rtlCol="0" anchor="b"/>
-          <a:lstStyle>
-            <a:lvl1pPr algn="l">
-              <a:defRPr sz="1200"/>
-            </a:lvl1pPr>
-          </a:lstStyle>
-          <a:p>
-            <a:endParaRPr lang="da-DK"/>
-          </a:p>
-        </p:txBody>
-      </p:sp>
-      <p:sp>
-        <p:nvSpPr>
-          <p:cNvPr id="7" name="Pladsholder til slidenummer 6"/>
-          <p:cNvSpPr>
-            <a:spLocks noGrp="1"/>
-          </p:cNvSpPr>
-          <p:nvPr>
-            <p:ph type="sldNum" sz="quarter" idx="5"/>
-          </p:nvPr>
-        </p:nvSpPr>
-        <p:spPr>
-          <a:xfrm>
-            <a:off x="3884613" y="8685213"/>
-            <a:ext cx="2971800" cy="458787"/>
-          </a:xfrm>
-          <a:prstGeom prst="rect">
-            <a:avLst/>
-          </a:prstGeom>
-        </p:spPr>
-        <p:txBody>
-          <a:bodyPr vert="horz" lIns="91440" tIns="45720" rIns="91440" bIns="45720" rtlCol="0" anchor="b"/>
-          <a:lstStyle>
-            <a:lvl1pPr algn="r">
-              <a:defRPr sz="1200"/>
-            </a:lvl1pPr>
-          </a:lstStyle>
-          <a:p>
-            <a:fld id="{AB48E9B3-BD9D-47BF-86A1-185792784468}" type="slidenum">
-              <a:rPr lang="da-DK" smtClean="0"/>
-              <a:t>‹nr.›</a:t>
-            </a:fld>
-            <a:endParaRPr lang="da-DK"/>
-          </a:p>
-        </p:txBody>
-      </p:sp>
-    </p:spTree>
-    <p:extLst>
-      <p:ext uri="{BB962C8B-B14F-4D97-AF65-F5344CB8AC3E}">
-        <p14:creationId xmlns:p14="http://schemas.microsoft.com/office/powerpoint/2010/main" val="829341893"/>
-      </p:ext>
-    </p:extLst>
-  </p:cSld>
-  <p:clrMap bg1="lt1" tx1="dk1" bg2="lt2" tx2="dk2" accent1="accent1" accent2="accent2" accent3="accent3" accent4="accent4" accent5="accent5" accent6="accent6" hlink="hlink" folHlink="folHlink"/>
-  <p:notesStyle>
-    <a:lvl1pPr marL="0" algn="l" defTabSz="914400" rtl="0" eaLnBrk="1" latinLnBrk="0" hangingPunct="1">
-      <a:defRPr sz="1200" kern="1200">
-        <a:solidFill>
-          <a:schemeClr val="tx1"/>
-        </a:solidFill>
-        <a:latin typeface="+mn-lt"/>
-        <a:ea typeface="+mn-ea"/>
-        <a:cs typeface="+mn-cs"/>
-      </a:defRPr>
-    </a:lvl1pPr>
-    <a:lvl2pPr marL="457200" algn="l" defTabSz="914400" rtl="0" eaLnBrk="1" latinLnBrk="0" hangingPunct="1">
-      <a:defRPr sz="1200" kern="1200">
-        <a:solidFill>
-          <a:schemeClr val="tx1"/>
-        </a:solidFill>
-        <a:latin typeface="+mn-lt"/>
-        <a:ea typeface="+mn-ea"/>
-        <a:cs typeface="+mn-cs"/>
-      </a:defRPr>
-    </a:lvl2pPr>
-    <a:lvl3pPr marL="914400" algn="l" defTabSz="914400" rtl="0" eaLnBrk="1" latinLnBrk="0" hangingPunct="1">
-      <a:defRPr sz="1200" kern="1200">
-        <a:solidFill>
-          <a:schemeClr val="tx1"/>
-        </a:solidFill>
-        <a:latin typeface="+mn-lt"/>
-        <a:ea typeface="+mn-ea"/>
-        <a:cs typeface="+mn-cs"/>
-      </a:defRPr>
-    </a:lvl3pPr>
-    <a:lvl4pPr marL="1371600" algn="l" defTabSz="914400" rtl="0" eaLnBrk="1" latinLnBrk="0" hangingPunct="1">
-      <a:defRPr sz="1200" kern="1200">
-        <a:solidFill>
-          <a:schemeClr val="tx1"/>
-        </a:solidFill>
-        <a:latin typeface="+mn-lt"/>
-        <a:ea typeface="+mn-ea"/>
-        <a:cs typeface="+mn-cs"/>
-      </a:defRPr>
-    </a:lvl4pPr>
-    <a:lvl5pPr marL="1828800" algn="l" defTabSz="914400" rtl="0" eaLnBrk="1" latinLnBrk="0" hangingPunct="1">
-      <a:defRPr sz="1200" kern="1200">
-        <a:solidFill>
-          <a:schemeClr val="tx1"/>
-        </a:solidFill>
-        <a:latin typeface="+mn-lt"/>
-        <a:ea typeface="+mn-ea"/>
-        <a:cs typeface="+mn-cs"/>
-      </a:defRPr>
-    </a:lvl5pPr>
-    <a:lvl6pPr marL="2286000" algn="l" defTabSz="914400" rtl="0" eaLnBrk="1" latinLnBrk="0" hangingPunct="1">
-      <a:defRPr sz="1200" kern="1200">
-        <a:solidFill>
-          <a:schemeClr val="tx1"/>
-        </a:solidFill>
-        <a:latin typeface="+mn-lt"/>
-        <a:ea typeface="+mn-ea"/>
-        <a:cs typeface="+mn-cs"/>
-      </a:defRPr>
-    </a:lvl6pPr>
-    <a:lvl7pPr marL="2743200" algn="l" defTabSz="914400" rtl="0" eaLnBrk="1" latinLnBrk="0" hangingPunct="1">
-      <a:defRPr sz="1200" kern="1200">
-        <a:solidFill>
-          <a:schemeClr val="tx1"/>
-        </a:solidFill>
-        <a:latin typeface="+mn-lt"/>
-        <a:ea typeface="+mn-ea"/>
-        <a:cs typeface="+mn-cs"/>
-      </a:defRPr>
-    </a:lvl7pPr>
-    <a:lvl8pPr marL="3200400" algn="l" defTabSz="914400" rtl="0" eaLnBrk="1" latinLnBrk="0" hangingPunct="1">
-      <a:defRPr sz="1200" kern="1200">
-        <a:solidFill>
-          <a:schemeClr val="tx1"/>
-        </a:solidFill>
-        <a:latin typeface="+mn-lt"/>
-        <a:ea typeface="+mn-ea"/>
-        <a:cs typeface="+mn-cs"/>
-      </a:defRPr>
-    </a:lvl8pPr>
-    <a:lvl9pPr marL="3657600" algn="l" defTabSz="914400" rtl="0" eaLnBrk="1" latinLnBrk="0" hangingPunct="1">
-      <a:defRPr sz="1200" kern="1200">
-        <a:solidFill>
-          <a:schemeClr val="tx1"/>
-        </a:solidFill>
-        <a:latin typeface="+mn-lt"/>
-        <a:ea typeface="+mn-ea"/>
-        <a:cs typeface="+mn-cs"/>
-      </a:defRPr>
-    </a:lvl9pPr>
-  </p:notesStyle>
-</p:notesMaster>
-</file>
-
-<file path=ppt/notesSlides/notesSlide1.xml><?xml version="1.0" encoding="utf-8"?>
-<p:notes xmlns:a="http://schemas.openxmlformats.org/drawingml/2006/main" xmlns:r="http://schemas.openxmlformats.org/officeDocument/2006/relationships" xmlns:p="http://schemas.openxmlformats.org/presentationml/2006/main">
-  <p:cSld>
-    <p:spTree>
-      <p:nvGrpSpPr>
-        <p:cNvPr id="1" name=""/>
-        <p:cNvGrpSpPr/>
-        <p:nvPr/>
-      </p:nvGrpSpPr>
-      <p:grpSpPr>
-        <a:xfrm>
-          <a:off x="0" y="0"/>
-          <a:ext cx="0" cy="0"/>
-          <a:chOff x="0" y="0"/>
-          <a:chExt cx="0" cy="0"/>
-        </a:xfrm>
-      </p:grpSpPr>
-      <p:sp>
-        <p:nvSpPr>
-          <p:cNvPr id="2" name="Pladsholder til slidebillede 1"/>
-          <p:cNvSpPr>
-            <a:spLocks noGrp="1" noRot="1" noChangeAspect="1"/>
-          </p:cNvSpPr>
-          <p:nvPr>
-            <p:ph type="sldImg"/>
-          </p:nvPr>
-        </p:nvSpPr>
-        <p:spPr/>
-      </p:sp>
-      <p:sp>
-        <p:nvSpPr>
-          <p:cNvPr id="3" name="Pladsholder til noter 2"/>
-          <p:cNvSpPr>
-            <a:spLocks noGrp="1"/>
-          </p:cNvSpPr>
-          <p:nvPr>
-            <p:ph type="body" idx="1"/>
-          </p:nvPr>
-        </p:nvSpPr>
-        <p:spPr/>
-        <p:txBody>
-          <a:bodyPr/>
-          <a:lstStyle/>
-          <a:p>
-            <a:r>
-              <a:rPr lang="da-DK" dirty="0" smtClean="0"/>
-              <a:t>Der</a:t>
-            </a:r>
-            <a:r>
-              <a:rPr lang="da-DK" baseline="0" dirty="0" smtClean="0"/>
-              <a:t> er to typer strukturer med </a:t>
-            </a:r>
-            <a:r>
-              <a:rPr lang="da-DK" baseline="0" dirty="0" err="1" smtClean="0"/>
-              <a:t>composite</a:t>
-            </a:r>
-            <a:r>
-              <a:rPr lang="da-DK" baseline="0" dirty="0" smtClean="0"/>
-              <a:t> pattern som kan ses her. Den første struktur er der en default klasse hvor implementeringen er i både component og </a:t>
-            </a:r>
-            <a:r>
-              <a:rPr lang="da-DK" baseline="0" dirty="0" err="1" smtClean="0"/>
-              <a:t>composite</a:t>
-            </a:r>
-            <a:r>
-              <a:rPr lang="da-DK" baseline="0" dirty="0" smtClean="0"/>
-              <a:t> hvorledes hvis der ikke er en metode implementeret i </a:t>
-            </a:r>
-            <a:r>
-              <a:rPr lang="da-DK" baseline="0" dirty="0" err="1" smtClean="0"/>
-              <a:t>composite</a:t>
-            </a:r>
-            <a:r>
-              <a:rPr lang="da-DK" baseline="0" dirty="0" smtClean="0"/>
-              <a:t>, så bliver der kastet en </a:t>
-            </a:r>
-            <a:r>
-              <a:rPr lang="da-DK" baseline="0" dirty="0" err="1" smtClean="0"/>
-              <a:t>exception</a:t>
-            </a:r>
-            <a:r>
-              <a:rPr lang="da-DK" baseline="0" dirty="0" smtClean="0"/>
-              <a:t> fra component. Hvis </a:t>
-            </a:r>
-            <a:r>
-              <a:rPr lang="da-DK" baseline="0" dirty="0" err="1" smtClean="0"/>
-              <a:t>composite</a:t>
-            </a:r>
-            <a:r>
-              <a:rPr lang="da-DK" baseline="0" dirty="0" smtClean="0"/>
-              <a:t> bliver kaldt med den metode der lægger i component. Den anden struktur er type sikker fordi at metoderne er delt op i </a:t>
-            </a:r>
-            <a:r>
-              <a:rPr lang="da-DK" baseline="0" dirty="0" err="1" smtClean="0"/>
-              <a:t>Composite</a:t>
-            </a:r>
-            <a:r>
-              <a:rPr lang="da-DK" baseline="0" dirty="0" smtClean="0"/>
-              <a:t> og Leaf, dvs. at de ikke får noget nedarvet fra Component som ikke er implementeret hvilket der ikke kan blive kaldt noget.</a:t>
-            </a:r>
-            <a:endParaRPr lang="da-DK" dirty="0"/>
-          </a:p>
-        </p:txBody>
-      </p:sp>
-      <p:sp>
-        <p:nvSpPr>
-          <p:cNvPr id="4" name="Pladsholder til slidenummer 3"/>
-          <p:cNvSpPr>
-            <a:spLocks noGrp="1"/>
-          </p:cNvSpPr>
-          <p:nvPr>
-            <p:ph type="sldNum" sz="quarter" idx="10"/>
-          </p:nvPr>
-        </p:nvSpPr>
-        <p:spPr/>
-        <p:txBody>
-          <a:bodyPr/>
-          <a:lstStyle/>
-          <a:p>
-            <a:fld id="{AB48E9B3-BD9D-47BF-86A1-185792784468}" type="slidenum">
-              <a:rPr lang="da-DK" smtClean="0"/>
-              <a:t>2</a:t>
-            </a:fld>
-            <a:endParaRPr lang="da-DK"/>
-          </a:p>
-        </p:txBody>
-      </p:sp>
-    </p:spTree>
-    <p:extLst>
-      <p:ext uri="{BB962C8B-B14F-4D97-AF65-F5344CB8AC3E}">
-        <p14:creationId xmlns:p14="http://schemas.microsoft.com/office/powerpoint/2010/main" val="2074268150"/>
-      </p:ext>
-    </p:extLst>
-  </p:cSld>
-  <p:clrMapOvr>
-    <a:masterClrMapping/>
-  </p:clrMapOvr>
-</p:notes>
-</file>
-
 <file path=ppt/slideLayouts/slideLayout1.xml><?xml version="1.0" encoding="utf-8"?>
 <p:sldLayout xmlns:a="http://schemas.openxmlformats.org/drawingml/2006/main" xmlns:r="http://schemas.openxmlformats.org/officeDocument/2006/relationships" xmlns:p="http://schemas.openxmlformats.org/presentationml/2006/main" type="title" preserve="1">
   <p:cSld name="Titelslide">
@@ -739,7 +247,7 @@
           <a:p>
             <a:fld id="{B3F1CA8E-6C86-481A-A457-6D0BAE499869}" type="datetimeFigureOut">
               <a:rPr lang="da-DK" smtClean="0"/>
-              <a:t>13-04-2018</a:t>
+              <a:t>15-04-2018</a:t>
             </a:fld>
             <a:endParaRPr lang="da-DK"/>
           </a:p>
@@ -907,7 +415,7 @@
           <a:p>
             <a:fld id="{B3F1CA8E-6C86-481A-A457-6D0BAE499869}" type="datetimeFigureOut">
               <a:rPr lang="da-DK" smtClean="0"/>
-              <a:t>13-04-2018</a:t>
+              <a:t>15-04-2018</a:t>
             </a:fld>
             <a:endParaRPr lang="da-DK"/>
           </a:p>
@@ -1085,7 +593,7 @@
           <a:p>
             <a:fld id="{B3F1CA8E-6C86-481A-A457-6D0BAE499869}" type="datetimeFigureOut">
               <a:rPr lang="da-DK" smtClean="0"/>
-              <a:t>13-04-2018</a:t>
+              <a:t>15-04-2018</a:t>
             </a:fld>
             <a:endParaRPr lang="da-DK"/>
           </a:p>
@@ -1253,7 +761,7 @@
           <a:p>
             <a:fld id="{B3F1CA8E-6C86-481A-A457-6D0BAE499869}" type="datetimeFigureOut">
               <a:rPr lang="da-DK" smtClean="0"/>
-              <a:t>13-04-2018</a:t>
+              <a:t>15-04-2018</a:t>
             </a:fld>
             <a:endParaRPr lang="da-DK"/>
           </a:p>
@@ -1498,7 +1006,7 @@
           <a:p>
             <a:fld id="{B3F1CA8E-6C86-481A-A457-6D0BAE499869}" type="datetimeFigureOut">
               <a:rPr lang="da-DK" smtClean="0"/>
-              <a:t>13-04-2018</a:t>
+              <a:t>15-04-2018</a:t>
             </a:fld>
             <a:endParaRPr lang="da-DK"/>
           </a:p>
@@ -1727,7 +1235,7 @@
           <a:p>
             <a:fld id="{B3F1CA8E-6C86-481A-A457-6D0BAE499869}" type="datetimeFigureOut">
               <a:rPr lang="da-DK" smtClean="0"/>
-              <a:t>13-04-2018</a:t>
+              <a:t>15-04-2018</a:t>
             </a:fld>
             <a:endParaRPr lang="da-DK"/>
           </a:p>
@@ -2091,7 +1599,7 @@
           <a:p>
             <a:fld id="{B3F1CA8E-6C86-481A-A457-6D0BAE499869}" type="datetimeFigureOut">
               <a:rPr lang="da-DK" smtClean="0"/>
-              <a:t>13-04-2018</a:t>
+              <a:t>15-04-2018</a:t>
             </a:fld>
             <a:endParaRPr lang="da-DK"/>
           </a:p>
@@ -2208,7 +1716,7 @@
           <a:p>
             <a:fld id="{B3F1CA8E-6C86-481A-A457-6D0BAE499869}" type="datetimeFigureOut">
               <a:rPr lang="da-DK" smtClean="0"/>
-              <a:t>13-04-2018</a:t>
+              <a:t>15-04-2018</a:t>
             </a:fld>
             <a:endParaRPr lang="da-DK"/>
           </a:p>
@@ -2303,7 +1811,7 @@
           <a:p>
             <a:fld id="{B3F1CA8E-6C86-481A-A457-6D0BAE499869}" type="datetimeFigureOut">
               <a:rPr lang="da-DK" smtClean="0"/>
-              <a:t>13-04-2018</a:t>
+              <a:t>15-04-2018</a:t>
             </a:fld>
             <a:endParaRPr lang="da-DK"/>
           </a:p>
@@ -2578,7 +2086,7 @@
           <a:p>
             <a:fld id="{B3F1CA8E-6C86-481A-A457-6D0BAE499869}" type="datetimeFigureOut">
               <a:rPr lang="da-DK" smtClean="0"/>
-              <a:t>13-04-2018</a:t>
+              <a:t>15-04-2018</a:t>
             </a:fld>
             <a:endParaRPr lang="da-DK"/>
           </a:p>
@@ -2830,7 +2338,7 @@
           <a:p>
             <a:fld id="{B3F1CA8E-6C86-481A-A457-6D0BAE499869}" type="datetimeFigureOut">
               <a:rPr lang="da-DK" smtClean="0"/>
-              <a:t>13-04-2018</a:t>
+              <a:t>15-04-2018</a:t>
             </a:fld>
             <a:endParaRPr lang="da-DK"/>
           </a:p>
@@ -3041,7 +2549,7 @@
           <a:p>
             <a:fld id="{B3F1CA8E-6C86-481A-A457-6D0BAE499869}" type="datetimeFigureOut">
               <a:rPr lang="da-DK" smtClean="0"/>
-              <a:t>13-04-2018</a:t>
+              <a:t>15-04-2018</a:t>
             </a:fld>
             <a:endParaRPr lang="da-DK"/>
           </a:p>
@@ -3549,13 +3057,6 @@
   <p:clrMapOvr>
     <a:masterClrMapping/>
   </p:clrMapOvr>
-  <p:timing>
-    <p:tnLst>
-      <p:par>
-        <p:cTn id="1" dur="indefinite" restart="never" nodeType="tmRoot"/>
-      </p:par>
-    </p:tnLst>
-  </p:timing>
 </p:sld>
 </file>
 
@@ -3604,7 +3105,7 @@
           <p:cNvPr id="4" name="Pladsholder til indhold 3">
             <a:extLst>
               <a:ext uri="{FF2B5EF4-FFF2-40B4-BE49-F238E27FC236}">
-                <a16:creationId xmlns:a16="http://schemas.microsoft.com/office/drawing/2014/main" xmlns="" id="{3B9C59C4-7281-44E4-A85A-4ECEA4DB96F9}"/>
+                <a16:creationId xmlns="" xmlns:a16="http://schemas.microsoft.com/office/drawing/2014/main" id="{3B9C59C4-7281-44E4-A85A-4ECEA4DB96F9}"/>
               </a:ext>
             </a:extLst>
           </p:cNvPr>
@@ -3616,7 +3117,7 @@
           </p:nvPr>
         </p:nvPicPr>
         <p:blipFill>
-          <a:blip r:embed="rId3"/>
+          <a:blip r:embed="rId2"/>
           <a:stretch>
             <a:fillRect/>
           </a:stretch>
@@ -3641,13 +3142,6 @@
   <p:clrMapOvr>
     <a:masterClrMapping/>
   </p:clrMapOvr>
-  <p:timing>
-    <p:tnLst>
-      <p:par>
-        <p:cTn id="1" dur="indefinite" restart="never" nodeType="tmRoot"/>
-      </p:par>
-    </p:tnLst>
-  </p:timing>
 </p:sld>
 </file>
 
@@ -3673,7 +3167,7 @@
           <p:cNvPr id="2" name="Titel 1">
             <a:extLst>
               <a:ext uri="{FF2B5EF4-FFF2-40B4-BE49-F238E27FC236}">
-                <a16:creationId xmlns:a16="http://schemas.microsoft.com/office/drawing/2014/main" xmlns="" id="{DCD50568-8FA1-4BB9-8B3A-F3D3B6EEFBA2}"/>
+                <a16:creationId xmlns="" xmlns:a16="http://schemas.microsoft.com/office/drawing/2014/main" id="{DCD50568-8FA1-4BB9-8B3A-F3D3B6EEFBA2}"/>
               </a:ext>
             </a:extLst>
           </p:cNvPr>
@@ -3702,7 +3196,7 @@
           <p:cNvPr id="4" name="Pladsholder til indhold 3">
             <a:extLst>
               <a:ext uri="{FF2B5EF4-FFF2-40B4-BE49-F238E27FC236}">
-                <a16:creationId xmlns:a16="http://schemas.microsoft.com/office/drawing/2014/main" xmlns="" id="{B039083F-D61E-441E-8A93-F29EC5D31AF5}"/>
+                <a16:creationId xmlns="" xmlns:a16="http://schemas.microsoft.com/office/drawing/2014/main" id="{B039083F-D61E-441E-8A93-F29EC5D31AF5}"/>
               </a:ext>
             </a:extLst>
           </p:cNvPr>
@@ -3739,13 +3233,6 @@
   <p:clrMapOvr>
     <a:masterClrMapping/>
   </p:clrMapOvr>
-  <p:timing>
-    <p:tnLst>
-      <p:par>
-        <p:cTn id="1" dur="indefinite" restart="never" nodeType="tmRoot"/>
-      </p:par>
-    </p:tnLst>
-  </p:timing>
 </p:sld>
 </file>
 
@@ -3766,15 +3253,46 @@
           <a:chExt cx="0" cy="0"/>
         </a:xfrm>
       </p:grpSpPr>
+      <p:sp>
+        <p:nvSpPr>
+          <p:cNvPr id="2" name="Titel 1">
+            <a:extLst>
+              <a:ext uri="{FF2B5EF4-FFF2-40B4-BE49-F238E27FC236}">
+                <a16:creationId xmlns="" xmlns:a16="http://schemas.microsoft.com/office/drawing/2014/main" id="{5E84420B-90F7-4D99-829E-FF1BF7DB1721}"/>
+              </a:ext>
+            </a:extLst>
+          </p:cNvPr>
+          <p:cNvSpPr>
+            <a:spLocks noGrp="1"/>
+          </p:cNvSpPr>
+          <p:nvPr>
+            <p:ph type="title"/>
+          </p:nvPr>
+        </p:nvSpPr>
+        <p:spPr/>
+        <p:txBody>
+          <a:bodyPr/>
+          <a:lstStyle/>
+          <a:p>
+            <a:r>
+              <a:rPr lang="da-DK" dirty="0"/>
+              <a:t>Tree </a:t>
+            </a:r>
+            <a:r>
+              <a:rPr lang="da-DK" dirty="0" err="1"/>
+              <a:t>structure</a:t>
+            </a:r>
+            <a:endParaRPr lang="da-DK" dirty="0"/>
+          </a:p>
+        </p:txBody>
+      </p:sp>
       <p:pic>
         <p:nvPicPr>
-          <p:cNvPr id="4" name="Pladsholder til indhold 3"/>
+          <p:cNvPr id="3" name="Billede 2"/>
           <p:cNvPicPr>
-            <a:picLocks noGrp="1" noChangeAspect="1"/>
+            <a:picLocks noChangeAspect="1"/>
           </p:cNvPicPr>
-          <p:nvPr>
-            <p:ph idx="1"/>
-          </p:nvPr>
+          <p:nvPr/>
         </p:nvPicPr>
         <p:blipFill>
           <a:blip r:embed="rId2"/>
@@ -3784,8 +3302,8 @@
         </p:blipFill>
         <p:spPr>
           <a:xfrm>
-            <a:off x="1365897" y="787652"/>
-            <a:ext cx="8480739" cy="5579434"/>
+            <a:off x="261937" y="2206970"/>
+            <a:ext cx="11668125" cy="2552700"/>
           </a:xfrm>
           <a:prstGeom prst="rect">
             <a:avLst/>
@@ -3794,27 +3312,19 @@
       </p:pic>
       <p:sp>
         <p:nvSpPr>
-          <p:cNvPr id="2" name="Titel 1"/>
-          <p:cNvSpPr>
-            <a:spLocks noGrp="1"/>
-          </p:cNvSpPr>
-          <p:nvPr>
-            <p:ph type="title"/>
-          </p:nvPr>
-        </p:nvSpPr>
-        <p:spPr/>
-        <p:txBody>
-          <a:bodyPr/>
-          <a:lstStyle/>
-          <a:p>
-            <a:r>
-              <a:rPr lang="da-DK" dirty="0" smtClean="0"/>
-              <a:t>Tree </a:t>
-            </a:r>
-            <a:r>
-              <a:rPr lang="da-DK" dirty="0" err="1" smtClean="0"/>
-              <a:t>structure</a:t>
-            </a:r>
+          <p:cNvPr id="5" name="Pladsholder til indhold 4"/>
+          <p:cNvSpPr>
+            <a:spLocks noGrp="1"/>
+          </p:cNvSpPr>
+          <p:nvPr>
+            <p:ph idx="1"/>
+          </p:nvPr>
+        </p:nvSpPr>
+        <p:spPr/>
+        <p:txBody>
+          <a:bodyPr/>
+          <a:lstStyle/>
+          <a:p>
             <a:endParaRPr lang="da-DK" dirty="0"/>
           </a:p>
         </p:txBody>
@@ -3822,7 +3332,7 @@
     </p:spTree>
     <p:extLst>
       <p:ext uri="{BB962C8B-B14F-4D97-AF65-F5344CB8AC3E}">
-        <p14:creationId xmlns:p14="http://schemas.microsoft.com/office/powerpoint/2010/main" val="2271857919"/>
+        <p14:creationId xmlns:p14="http://schemas.microsoft.com/office/powerpoint/2010/main" val="1251676457"/>
       </p:ext>
     </p:extLst>
   </p:cSld>
@@ -3861,7 +3371,7 @@
           <p:cNvPr id="2" name="Titel 1">
             <a:extLst>
               <a:ext uri="{FF2B5EF4-FFF2-40B4-BE49-F238E27FC236}">
-                <a16:creationId xmlns:a16="http://schemas.microsoft.com/office/drawing/2014/main" xmlns="" id="{5E84420B-90F7-4D99-829E-FF1BF7DB1721}"/>
+                <a16:creationId xmlns="" xmlns:a16="http://schemas.microsoft.com/office/drawing/2014/main" id="{8AFA5085-7572-4CF2-A06B-7BE2E4F4FA13}"/>
               </a:ext>
             </a:extLst>
           </p:cNvPr>
@@ -3878,24 +3388,31 @@
           <a:lstStyle/>
           <a:p>
             <a:r>
+              <a:rPr lang="da-DK" dirty="0" err="1"/>
+              <a:t>Sequence</a:t>
+            </a:r>
+            <a:r>
               <a:rPr lang="da-DK" dirty="0"/>
-              <a:t>Tree </a:t>
-            </a:r>
-            <a:r>
-              <a:rPr lang="da-DK" dirty="0" err="1"/>
-              <a:t>structure</a:t>
-            </a:r>
-            <a:endParaRPr lang="da-DK" dirty="0"/>
+              <a:t> diagram</a:t>
+            </a:r>
           </a:p>
         </p:txBody>
       </p:sp>
       <p:pic>
         <p:nvPicPr>
-          <p:cNvPr id="3" name="Billede 2"/>
+          <p:cNvPr id="4" name="Pladsholder til indhold 3">
+            <a:extLst>
+              <a:ext uri="{FF2B5EF4-FFF2-40B4-BE49-F238E27FC236}">
+                <a16:creationId xmlns="" xmlns:a16="http://schemas.microsoft.com/office/drawing/2014/main" id="{5C11F194-7370-4F87-9FA5-E3D871D39865}"/>
+              </a:ext>
+            </a:extLst>
+          </p:cNvPr>
           <p:cNvPicPr>
-            <a:picLocks noChangeAspect="1"/>
+            <a:picLocks noGrp="1" noChangeAspect="1"/>
           </p:cNvPicPr>
-          <p:nvPr/>
+          <p:nvPr>
+            <p:ph idx="1"/>
+          </p:nvPr>
         </p:nvPicPr>
         <p:blipFill>
           <a:blip r:embed="rId2"/>
@@ -3905,37 +3422,18 @@
         </p:blipFill>
         <p:spPr>
           <a:xfrm>
-            <a:off x="261937" y="2206970"/>
-            <a:ext cx="11668125" cy="2552700"/>
+            <a:off x="2872445" y="1825625"/>
+            <a:ext cx="6447109" cy="4351338"/>
           </a:xfrm>
           <a:prstGeom prst="rect">
             <a:avLst/>
           </a:prstGeom>
         </p:spPr>
       </p:pic>
-      <p:sp>
-        <p:nvSpPr>
-          <p:cNvPr id="5" name="Pladsholder til indhold 4"/>
-          <p:cNvSpPr>
-            <a:spLocks noGrp="1"/>
-          </p:cNvSpPr>
-          <p:nvPr>
-            <p:ph idx="1"/>
-          </p:nvPr>
-        </p:nvSpPr>
-        <p:spPr/>
-        <p:txBody>
-          <a:bodyPr/>
-          <a:lstStyle/>
-          <a:p>
-            <a:endParaRPr lang="da-DK" dirty="0"/>
-          </a:p>
-        </p:txBody>
-      </p:sp>
     </p:spTree>
     <p:extLst>
       <p:ext uri="{BB962C8B-B14F-4D97-AF65-F5344CB8AC3E}">
-        <p14:creationId xmlns:p14="http://schemas.microsoft.com/office/powerpoint/2010/main" val="1251676457"/>
+        <p14:creationId xmlns:p14="http://schemas.microsoft.com/office/powerpoint/2010/main" val="1546812545"/>
       </p:ext>
     </p:extLst>
   </p:cSld>
@@ -3974,7 +3472,7 @@
           <p:cNvPr id="2" name="Titel 1">
             <a:extLst>
               <a:ext uri="{FF2B5EF4-FFF2-40B4-BE49-F238E27FC236}">
-                <a16:creationId xmlns:a16="http://schemas.microsoft.com/office/drawing/2014/main" xmlns="" id="{4AC9FC2A-FBFF-4C1C-9CE6-080EFA1DA6B9}"/>
+                <a16:creationId xmlns="" xmlns:a16="http://schemas.microsoft.com/office/drawing/2014/main" id="{4711DCFD-83F7-4AAF-9C8D-17FE0DBA2F90}"/>
               </a:ext>
             </a:extLst>
           </p:cNvPr>
@@ -3991,10 +3489,9 @@
           <a:lstStyle/>
           <a:p>
             <a:r>
-              <a:rPr lang="da-DK" dirty="0" err="1"/>
-              <a:t>Conclusion</a:t>
-            </a:r>
-            <a:endParaRPr lang="da-DK" dirty="0"/>
+              <a:rPr lang="da-DK" dirty="0"/>
+              <a:t>SOLID</a:t>
+            </a:r>
           </a:p>
         </p:txBody>
       </p:sp>
@@ -4003,7 +3500,7 @@
           <p:cNvPr id="3" name="Pladsholder til indhold 2">
             <a:extLst>
               <a:ext uri="{FF2B5EF4-FFF2-40B4-BE49-F238E27FC236}">
-                <a16:creationId xmlns:a16="http://schemas.microsoft.com/office/drawing/2014/main" xmlns="" id="{A595FA15-363D-42DB-A330-FEB682E2B11B}"/>
+                <a16:creationId xmlns="" xmlns:a16="http://schemas.microsoft.com/office/drawing/2014/main" id="{3CBB8E04-EAB6-48AD-8E67-9CFBEDA1752C}"/>
               </a:ext>
             </a:extLst>
           </p:cNvPr>
@@ -4020,6 +3517,164 @@
           <a:lstStyle/>
           <a:p>
             <a:r>
+              <a:rPr lang="da-DK" dirty="0"/>
+              <a:t>Single </a:t>
+            </a:r>
+            <a:r>
+              <a:rPr lang="da-DK" dirty="0" err="1"/>
+              <a:t>resp</a:t>
+            </a:r>
+            <a:r>
+              <a:rPr lang="da-DK" dirty="0"/>
+              <a:t>. – ikke brugt pga. overordnet klasse ”Component”</a:t>
+            </a:r>
+          </a:p>
+          <a:p>
+            <a:r>
+              <a:rPr lang="da-DK" dirty="0"/>
+              <a:t>Open-</a:t>
+            </a:r>
+            <a:r>
+              <a:rPr lang="da-DK" dirty="0" err="1"/>
+              <a:t>closed</a:t>
+            </a:r>
+            <a:r>
+              <a:rPr lang="da-DK" dirty="0"/>
+              <a:t> – ændringer kræver ændringer i implementerede klasser</a:t>
+            </a:r>
+          </a:p>
+          <a:p>
+            <a:r>
+              <a:rPr lang="da-DK" dirty="0" err="1"/>
+              <a:t>Liskov</a:t>
+            </a:r>
+            <a:r>
+              <a:rPr lang="da-DK" dirty="0"/>
+              <a:t> sub. – muligt at substituere Leaf og Composite med hinanden</a:t>
+            </a:r>
+          </a:p>
+          <a:p>
+            <a:r>
+              <a:rPr lang="da-DK" dirty="0"/>
+              <a:t>Interface </a:t>
+            </a:r>
+            <a:r>
+              <a:rPr lang="da-DK" dirty="0" err="1"/>
+              <a:t>seg</a:t>
+            </a:r>
+            <a:r>
+              <a:rPr lang="da-DK" dirty="0"/>
+              <a:t>. – ingen interfaces anvendt</a:t>
+            </a:r>
+          </a:p>
+          <a:p>
+            <a:r>
+              <a:rPr lang="da-DK" dirty="0" err="1"/>
+              <a:t>Dependency</a:t>
+            </a:r>
+            <a:r>
+              <a:rPr lang="da-DK" dirty="0"/>
+              <a:t> </a:t>
+            </a:r>
+            <a:r>
+              <a:rPr lang="da-DK" dirty="0" err="1"/>
+              <a:t>inv</a:t>
+            </a:r>
+            <a:r>
+              <a:rPr lang="da-DK" dirty="0"/>
+              <a:t>. – Leaf og Composite er ikke afhængige af hinanden, kun af Component</a:t>
+            </a:r>
+          </a:p>
+        </p:txBody>
+      </p:sp>
+    </p:spTree>
+    <p:extLst>
+      <p:ext uri="{BB962C8B-B14F-4D97-AF65-F5344CB8AC3E}">
+        <p14:creationId xmlns:p14="http://schemas.microsoft.com/office/powerpoint/2010/main" val="536930262"/>
+      </p:ext>
+    </p:extLst>
+  </p:cSld>
+  <p:clrMapOvr>
+    <a:masterClrMapping/>
+  </p:clrMapOvr>
+  <p:timing>
+    <p:tnLst>
+      <p:par>
+        <p:cTn id="1" dur="indefinite" restart="never" nodeType="tmRoot"/>
+      </p:par>
+    </p:tnLst>
+  </p:timing>
+</p:sld>
+</file>
+
+<file path=ppt/slides/slide7.xml><?xml version="1.0" encoding="utf-8"?>
+<p:sld xmlns:a="http://schemas.openxmlformats.org/drawingml/2006/main" xmlns:r="http://schemas.openxmlformats.org/officeDocument/2006/relationships" xmlns:p="http://schemas.openxmlformats.org/presentationml/2006/main">
+  <p:cSld>
+    <p:spTree>
+      <p:nvGrpSpPr>
+        <p:cNvPr id="1" name=""/>
+        <p:cNvGrpSpPr/>
+        <p:nvPr/>
+      </p:nvGrpSpPr>
+      <p:grpSpPr>
+        <a:xfrm>
+          <a:off x="0" y="0"/>
+          <a:ext cx="0" cy="0"/>
+          <a:chOff x="0" y="0"/>
+          <a:chExt cx="0" cy="0"/>
+        </a:xfrm>
+      </p:grpSpPr>
+      <p:sp>
+        <p:nvSpPr>
+          <p:cNvPr id="2" name="Titel 1">
+            <a:extLst>
+              <a:ext uri="{FF2B5EF4-FFF2-40B4-BE49-F238E27FC236}">
+                <a16:creationId xmlns="" xmlns:a16="http://schemas.microsoft.com/office/drawing/2014/main" id="{4AC9FC2A-FBFF-4C1C-9CE6-080EFA1DA6B9}"/>
+              </a:ext>
+            </a:extLst>
+          </p:cNvPr>
+          <p:cNvSpPr>
+            <a:spLocks noGrp="1"/>
+          </p:cNvSpPr>
+          <p:nvPr>
+            <p:ph type="title"/>
+          </p:nvPr>
+        </p:nvSpPr>
+        <p:spPr/>
+        <p:txBody>
+          <a:bodyPr/>
+          <a:lstStyle/>
+          <a:p>
+            <a:r>
+              <a:rPr lang="da-DK" dirty="0" err="1"/>
+              <a:t>Conclusion</a:t>
+            </a:r>
+            <a:endParaRPr lang="da-DK" dirty="0"/>
+          </a:p>
+        </p:txBody>
+      </p:sp>
+      <p:sp>
+        <p:nvSpPr>
+          <p:cNvPr id="3" name="Pladsholder til indhold 2">
+            <a:extLst>
+              <a:ext uri="{FF2B5EF4-FFF2-40B4-BE49-F238E27FC236}">
+                <a16:creationId xmlns="" xmlns:a16="http://schemas.microsoft.com/office/drawing/2014/main" id="{A595FA15-363D-42DB-A330-FEB682E2B11B}"/>
+              </a:ext>
+            </a:extLst>
+          </p:cNvPr>
+          <p:cNvSpPr>
+            <a:spLocks noGrp="1"/>
+          </p:cNvSpPr>
+          <p:nvPr>
+            <p:ph idx="1"/>
+          </p:nvPr>
+        </p:nvSpPr>
+        <p:spPr/>
+        <p:txBody>
+          <a:bodyPr/>
+          <a:lstStyle/>
+          <a:p>
+            <a:r>
               <a:rPr lang="da-DK" dirty="0" err="1"/>
               <a:t>Generic</a:t>
             </a:r>
@@ -4062,20 +3717,8 @@
               <a:t> backs: Bad if wanting to </a:t>
             </a:r>
             <a:r>
-              <a:rPr lang="da-DK" dirty="0" err="1" smtClean="0"/>
+              <a:rPr lang="da-DK" dirty="0" err="1"/>
               <a:t>extend</a:t>
-            </a:r>
-            <a:r>
-              <a:rPr lang="da-DK" dirty="0" smtClean="0"/>
-              <a:t> (new </a:t>
-            </a:r>
-            <a:r>
-              <a:rPr lang="da-DK" dirty="0" err="1" smtClean="0"/>
-              <a:t>methods</a:t>
-            </a:r>
-            <a:r>
-              <a:rPr lang="da-DK" dirty="0" smtClean="0"/>
-              <a:t>)</a:t>
             </a:r>
             <a:endParaRPr lang="da-DK" dirty="0"/>
           </a:p>
@@ -4360,265 +4003,4 @@
     </a:ext>
   </a:extLst>
 </a:theme>
-</file>
-
-<file path=ppt/theme/theme2.xml><?xml version="1.0" encoding="utf-8"?>
-<a:theme xmlns:a="http://schemas.openxmlformats.org/drawingml/2006/main" name="Office-tema">
-  <a:themeElements>
-    <a:clrScheme name="Kontor">
-      <a:dk1>
-        <a:sysClr val="windowText" lastClr="000000"/>
-      </a:dk1>
-      <a:lt1>
-        <a:sysClr val="window" lastClr="FFFFFF"/>
-      </a:lt1>
-      <a:dk2>
-        <a:srgbClr val="44546A"/>
-      </a:dk2>
-      <a:lt2>
-        <a:srgbClr val="E7E6E6"/>
-      </a:lt2>
-      <a:accent1>
-        <a:srgbClr val="5B9BD5"/>
-      </a:accent1>
-      <a:accent2>
-        <a:srgbClr val="ED7D31"/>
-      </a:accent2>
-      <a:accent3>
-        <a:srgbClr val="A5A5A5"/>
-      </a:accent3>
-      <a:accent4>
-        <a:srgbClr val="FFC000"/>
-      </a:accent4>
-      <a:accent5>
-        <a:srgbClr val="4472C4"/>
-      </a:accent5>
-      <a:accent6>
-        <a:srgbClr val="70AD47"/>
-      </a:accent6>
-      <a:hlink>
-        <a:srgbClr val="0563C1"/>
-      </a:hlink>
-      <a:folHlink>
-        <a:srgbClr val="954F72"/>
-      </a:folHlink>
-    </a:clrScheme>
-    <a:fontScheme name="Kontor">
-      <a:majorFont>
-        <a:latin typeface="Calibri Light" panose="020F0302020204030204"/>
-        <a:ea typeface=""/>
-        <a:cs typeface=""/>
-        <a:font script="Jpan" typeface="ＭＳ Ｐゴシック"/>
-        <a:font script="Hang" typeface="맑은 고딕"/>
-        <a:font script="Hans" typeface="宋体"/>
-        <a:font script="Hant" typeface="新細明體"/>
-        <a:font script="Arab" typeface="Times New Roman"/>
-        <a:font script="Hebr" typeface="Times New Roman"/>
-        <a:font script="Thai" typeface="Angsana New"/>
-        <a:font script="Ethi" typeface="Nyala"/>
-        <a:font script="Beng" typeface="Vrinda"/>
-        <a:font script="Gujr" typeface="Shruti"/>
-        <a:font script="Khmr" typeface="MoolBoran"/>
-        <a:font script="Knda" typeface="Tunga"/>
-        <a:font script="Guru" typeface="Raavi"/>
-        <a:font script="Cans" typeface="Euphemia"/>
-        <a:font script="Cher" typeface="Plantagenet Cherokee"/>
-        <a:font script="Yiii" typeface="Microsoft Yi Baiti"/>
-        <a:font script="Tibt" typeface="Microsoft Himalaya"/>
-        <a:font script="Thaa" typeface="MV Boli"/>
-        <a:font script="Deva" typeface="Mangal"/>
-        <a:font script="Telu" typeface="Gautami"/>
-        <a:font script="Taml" typeface="Latha"/>
-        <a:font script="Syrc" typeface="Estrangelo Edessa"/>
-        <a:font script="Orya" typeface="Kalinga"/>
-        <a:font script="Mlym" typeface="Kartika"/>
-        <a:font script="Laoo" typeface="DokChampa"/>
-        <a:font script="Sinh" typeface="Iskoola Pota"/>
-        <a:font script="Mong" typeface="Mongolian Baiti"/>
-        <a:font script="Viet" typeface="Times New Roman"/>
-        <a:font script="Uigh" typeface="Microsoft Uighur"/>
-        <a:font script="Geor" typeface="Sylfaen"/>
-      </a:majorFont>
-      <a:minorFont>
-        <a:latin typeface="Calibri" panose="020F0502020204030204"/>
-        <a:ea typeface=""/>
-        <a:cs typeface=""/>
-        <a:font script="Jpan" typeface="ＭＳ Ｐゴシック"/>
-        <a:font script="Hang" typeface="맑은 고딕"/>
-        <a:font script="Hans" typeface="宋体"/>
-        <a:font script="Hant" typeface="新細明體"/>
-        <a:font script="Arab" typeface="Arial"/>
-        <a:font script="Hebr" typeface="Arial"/>
-        <a:font script="Thai" typeface="Cordia New"/>
-        <a:font script="Ethi" typeface="Nyala"/>
-        <a:font script="Beng" typeface="Vrinda"/>
-        <a:font script="Gujr" typeface="Shruti"/>
-        <a:font script="Khmr" typeface="DaunPenh"/>
-        <a:font script="Knda" typeface="Tunga"/>
-        <a:font script="Guru" typeface="Raavi"/>
-        <a:font script="Cans" typeface="Euphemia"/>
-        <a:font script="Cher" typeface="Plantagenet Cherokee"/>
-        <a:font script="Yiii" typeface="Microsoft Yi Baiti"/>
-        <a:font script="Tibt" typeface="Microsoft Himalaya"/>
-        <a:font script="Thaa" typeface="MV Boli"/>
-        <a:font script="Deva" typeface="Mangal"/>
-        <a:font script="Telu" typeface="Gautami"/>
-        <a:font script="Taml" typeface="Latha"/>
-        <a:font script="Syrc" typeface="Estrangelo Edessa"/>
-        <a:font script="Orya" typeface="Kalinga"/>
-        <a:font script="Mlym" typeface="Kartika"/>
-        <a:font script="Laoo" typeface="DokChampa"/>
-        <a:font script="Sinh" typeface="Iskoola Pota"/>
-        <a:font script="Mong" typeface="Mongolian Baiti"/>
-        <a:font script="Viet" typeface="Arial"/>
-        <a:font script="Uigh" typeface="Microsoft Uighur"/>
-        <a:font script="Geor" typeface="Sylfaen"/>
-      </a:minorFont>
-    </a:fontScheme>
-    <a:fmtScheme name="Kontor">
-      <a:fillStyleLst>
-        <a:solidFill>
-          <a:schemeClr val="phClr"/>
-        </a:solidFill>
-        <a:gradFill rotWithShape="1">
-          <a:gsLst>
-            <a:gs pos="0">
-              <a:schemeClr val="phClr">
-                <a:lumMod val="110000"/>
-                <a:satMod val="105000"/>
-                <a:tint val="67000"/>
-              </a:schemeClr>
-            </a:gs>
-            <a:gs pos="50000">
-              <a:schemeClr val="phClr">
-                <a:lumMod val="105000"/>
-                <a:satMod val="103000"/>
-                <a:tint val="73000"/>
-              </a:schemeClr>
-            </a:gs>
-            <a:gs pos="100000">
-              <a:schemeClr val="phClr">
-                <a:lumMod val="105000"/>
-                <a:satMod val="109000"/>
-                <a:tint val="81000"/>
-              </a:schemeClr>
-            </a:gs>
-          </a:gsLst>
-          <a:lin ang="5400000" scaled="0"/>
-        </a:gradFill>
-        <a:gradFill rotWithShape="1">
-          <a:gsLst>
-            <a:gs pos="0">
-              <a:schemeClr val="phClr">
-                <a:satMod val="103000"/>
-                <a:lumMod val="102000"/>
-                <a:tint val="94000"/>
-              </a:schemeClr>
-            </a:gs>
-            <a:gs pos="50000">
-              <a:schemeClr val="phClr">
-                <a:satMod val="110000"/>
-                <a:lumMod val="100000"/>
-                <a:shade val="100000"/>
-              </a:schemeClr>
-            </a:gs>
-            <a:gs pos="100000">
-              <a:schemeClr val="phClr">
-                <a:lumMod val="99000"/>
-                <a:satMod val="120000"/>
-                <a:shade val="78000"/>
-              </a:schemeClr>
-            </a:gs>
-          </a:gsLst>
-          <a:lin ang="5400000" scaled="0"/>
-        </a:gradFill>
-      </a:fillStyleLst>
-      <a:lnStyleLst>
-        <a:ln w="6350" cap="flat" cmpd="sng" algn="ctr">
-          <a:solidFill>
-            <a:schemeClr val="phClr"/>
-          </a:solidFill>
-          <a:prstDash val="solid"/>
-          <a:miter lim="800000"/>
-        </a:ln>
-        <a:ln w="12700" cap="flat" cmpd="sng" algn="ctr">
-          <a:solidFill>
-            <a:schemeClr val="phClr"/>
-          </a:solidFill>
-          <a:prstDash val="solid"/>
-          <a:miter lim="800000"/>
-        </a:ln>
-        <a:ln w="19050" cap="flat" cmpd="sng" algn="ctr">
-          <a:solidFill>
-            <a:schemeClr val="phClr"/>
-          </a:solidFill>
-          <a:prstDash val="solid"/>
-          <a:miter lim="800000"/>
-        </a:ln>
-      </a:lnStyleLst>
-      <a:effectStyleLst>
-        <a:effectStyle>
-          <a:effectLst/>
-        </a:effectStyle>
-        <a:effectStyle>
-          <a:effectLst/>
-        </a:effectStyle>
-        <a:effectStyle>
-          <a:effectLst>
-            <a:outerShdw blurRad="57150" dist="19050" dir="5400000" algn="ctr" rotWithShape="0">
-              <a:srgbClr val="000000">
-                <a:alpha val="63000"/>
-              </a:srgbClr>
-            </a:outerShdw>
-          </a:effectLst>
-        </a:effectStyle>
-      </a:effectStyleLst>
-      <a:bgFillStyleLst>
-        <a:solidFill>
-          <a:schemeClr val="phClr"/>
-        </a:solidFill>
-        <a:solidFill>
-          <a:schemeClr val="phClr">
-            <a:tint val="95000"/>
-            <a:satMod val="170000"/>
-          </a:schemeClr>
-        </a:solidFill>
-        <a:gradFill rotWithShape="1">
-          <a:gsLst>
-            <a:gs pos="0">
-              <a:schemeClr val="phClr">
-                <a:tint val="93000"/>
-                <a:satMod val="150000"/>
-                <a:shade val="98000"/>
-                <a:lumMod val="102000"/>
-              </a:schemeClr>
-            </a:gs>
-            <a:gs pos="50000">
-              <a:schemeClr val="phClr">
-                <a:tint val="98000"/>
-                <a:satMod val="130000"/>
-                <a:shade val="90000"/>
-                <a:lumMod val="103000"/>
-              </a:schemeClr>
-            </a:gs>
-            <a:gs pos="100000">
-              <a:schemeClr val="phClr">
-                <a:shade val="63000"/>
-                <a:satMod val="120000"/>
-              </a:schemeClr>
-            </a:gs>
-          </a:gsLst>
-          <a:lin ang="5400000" scaled="0"/>
-        </a:gradFill>
-      </a:bgFillStyleLst>
-    </a:fmtScheme>
-  </a:themeElements>
-  <a:objectDefaults/>
-  <a:extraClrSchemeLst/>
-  <a:extLst>
-    <a:ext uri="{05A4C25C-085E-4340-85A3-A5531E510DB2}">
-      <thm15:themeFamily xmlns:thm15="http://schemas.microsoft.com/office/thememl/2012/main" name="Office Theme" id="{62F939B6-93AF-4DB8-9C6B-D6C7DFDC589F}" vid="{4A3C46E8-61CC-4603-A589-7422A47A8E4A}"/>
-    </a:ext>
-  </a:extLst>
-</a:theme>
 </file>
</xml_diff>